<commit_message>
Added outputs to ppt
</commit_message>
<xml_diff>
--- a/Housing in Orange County, FL.pptx
+++ b/Housing in Orange County, FL.pptx
@@ -5,10 +5,10 @@
     <p:sldMasterId id="2147483648" r:id="rId1"/>
   </p:sldMasterIdLst>
   <p:notesMasterIdLst>
-    <p:notesMasterId r:id="rId11"/>
+    <p:notesMasterId r:id="rId12"/>
   </p:notesMasterIdLst>
   <p:handoutMasterIdLst>
-    <p:handoutMasterId r:id="rId12"/>
+    <p:handoutMasterId r:id="rId13"/>
   </p:handoutMasterIdLst>
   <p:sldIdLst>
     <p:sldId id="256" r:id="rId2"/>
@@ -16,10 +16,11 @@
     <p:sldId id="258" r:id="rId4"/>
     <p:sldId id="259" r:id="rId5"/>
     <p:sldId id="260" r:id="rId6"/>
-    <p:sldId id="261" r:id="rId7"/>
-    <p:sldId id="262" r:id="rId8"/>
-    <p:sldId id="263" r:id="rId9"/>
-    <p:sldId id="264" r:id="rId10"/>
+    <p:sldId id="265" r:id="rId7"/>
+    <p:sldId id="266" r:id="rId8"/>
+    <p:sldId id="261" r:id="rId9"/>
+    <p:sldId id="263" r:id="rId10"/>
+    <p:sldId id="264" r:id="rId11"/>
   </p:sldIdLst>
   <p:sldSz cx="12192000" cy="6858000"/>
   <p:notesSz cx="6858000" cy="9144000"/>
@@ -3925,8 +3926,8 @@
         </p:nvSpPr>
         <p:spPr>
           <a:xfrm>
-            <a:off x="2417779" y="4030242"/>
-            <a:ext cx="8637072" cy="479008"/>
+            <a:off x="606674" y="5273246"/>
+            <a:ext cx="10064251" cy="479008"/>
           </a:xfrm>
           <a:prstGeom prst="rect">
             <a:avLst/>
@@ -4146,6 +4147,7 @@
             </a:lvl9pPr>
           </a:lstStyle>
           <a:p>
+            <a:pPr algn="ctr"/>
             <a:r>
               <a:rPr lang="en-US" sz="1600" cap="none" dirty="0"/>
               <a:t>Created by: Cindy </a:t>
@@ -4156,15 +4158,7 @@
             </a:r>
             <a:r>
               <a:rPr lang="en-US" sz="1600" cap="none" dirty="0"/>
-              <a:t>, Elizabeth Jaye, </a:t>
-            </a:r>
-            <a:r>
-              <a:rPr lang="en-US" sz="1600" cap="none" dirty="0" err="1"/>
-              <a:t>Dinielle</a:t>
-            </a:r>
-            <a:r>
-              <a:rPr lang="en-US" sz="1600" cap="none" dirty="0"/>
-              <a:t> Nelson, Robert </a:t>
+              <a:t>, Elizabeth Jaye, Dinielle Nelson, Robert </a:t>
             </a:r>
             <a:r>
               <a:rPr lang="en-US" sz="1600" cap="none" dirty="0" err="1"/>
@@ -4172,15 +4166,146 @@
             </a:r>
             <a:r>
               <a:rPr lang="en-US" sz="1600" cap="none" dirty="0"/>
-              <a:t>, And Dolly Vickers</a:t>
-            </a:r>
-          </a:p>
-        </p:txBody>
-      </p:sp>
+              <a:t>, and Dolly Vickers</a:t>
+            </a:r>
+          </a:p>
+        </p:txBody>
+      </p:sp>
+      <p:cxnSp>
+        <p:nvCxnSpPr>
+          <p:cNvPr id="6" name="Straight Connector 5">
+            <a:extLst>
+              <a:ext uri="{FF2B5EF4-FFF2-40B4-BE49-F238E27FC236}">
+                <a16:creationId xmlns:a16="http://schemas.microsoft.com/office/drawing/2014/main" id="{06705005-9860-49AA-95B0-6FE6DBC6D0C8}"/>
+              </a:ext>
+            </a:extLst>
+          </p:cNvPr>
+          <p:cNvCxnSpPr/>
+          <p:nvPr/>
+        </p:nvCxnSpPr>
+        <p:spPr>
+          <a:xfrm>
+            <a:off x="1371599" y="5273246"/>
+            <a:ext cx="8534400" cy="0"/>
+          </a:xfrm>
+          <a:prstGeom prst="line">
+            <a:avLst/>
+          </a:prstGeom>
+        </p:spPr>
+        <p:style>
+          <a:lnRef idx="1">
+            <a:schemeClr val="accent1"/>
+          </a:lnRef>
+          <a:fillRef idx="0">
+            <a:schemeClr val="accent1"/>
+          </a:fillRef>
+          <a:effectRef idx="0">
+            <a:schemeClr val="accent1"/>
+          </a:effectRef>
+          <a:fontRef idx="minor">
+            <a:schemeClr val="tx1"/>
+          </a:fontRef>
+        </p:style>
+      </p:cxnSp>
     </p:spTree>
     <p:extLst>
       <p:ext uri="{BB962C8B-B14F-4D97-AF65-F5344CB8AC3E}">
         <p14:creationId xmlns:p14="http://schemas.microsoft.com/office/powerpoint/2010/main" val="621183294"/>
+      </p:ext>
+    </p:extLst>
+  </p:cSld>
+  <p:clrMapOvr>
+    <a:masterClrMapping/>
+  </p:clrMapOvr>
+  <mc:AlternateContent xmlns:mc="http://schemas.openxmlformats.org/markup-compatibility/2006" xmlns:p14="http://schemas.microsoft.com/office/powerpoint/2010/main">
+    <mc:Choice Requires="p14">
+      <p:transition spd="med" p14:dur="700">
+        <p:fade/>
+      </p:transition>
+    </mc:Choice>
+    <mc:Fallback xmlns="">
+      <p:transition spd="med">
+        <p:fade/>
+      </p:transition>
+    </mc:Fallback>
+  </mc:AlternateContent>
+</p:sld>
+</file>
+
+<file path=ppt/slides/slide10.xml><?xml version="1.0" encoding="utf-8"?>
+<p:sld xmlns:a="http://schemas.openxmlformats.org/drawingml/2006/main" xmlns:r="http://schemas.openxmlformats.org/officeDocument/2006/relationships" xmlns:p="http://schemas.openxmlformats.org/presentationml/2006/main">
+  <p:cSld>
+    <p:spTree>
+      <p:nvGrpSpPr>
+        <p:cNvPr id="1" name=""/>
+        <p:cNvGrpSpPr/>
+        <p:nvPr/>
+      </p:nvGrpSpPr>
+      <p:grpSpPr>
+        <a:xfrm>
+          <a:off x="0" y="0"/>
+          <a:ext cx="0" cy="0"/>
+          <a:chOff x="0" y="0"/>
+          <a:chExt cx="0" cy="0"/>
+        </a:xfrm>
+      </p:grpSpPr>
+      <p:sp>
+        <p:nvSpPr>
+          <p:cNvPr id="2" name="Title 1">
+            <a:extLst>
+              <a:ext uri="{FF2B5EF4-FFF2-40B4-BE49-F238E27FC236}">
+                <a16:creationId xmlns:a16="http://schemas.microsoft.com/office/drawing/2014/main" id="{0CD2D5C9-5FA3-43AC-A9F0-864EB45FA257}"/>
+              </a:ext>
+            </a:extLst>
+          </p:cNvPr>
+          <p:cNvSpPr>
+            <a:spLocks noGrp="1"/>
+          </p:cNvSpPr>
+          <p:nvPr>
+            <p:ph type="ctrTitle"/>
+          </p:nvPr>
+        </p:nvSpPr>
+        <p:spPr/>
+        <p:txBody>
+          <a:bodyPr/>
+          <a:lstStyle/>
+          <a:p>
+            <a:r>
+              <a:rPr lang="en-US" dirty="0"/>
+              <a:t>Questions &amp; Answers</a:t>
+            </a:r>
+          </a:p>
+        </p:txBody>
+      </p:sp>
+      <p:sp>
+        <p:nvSpPr>
+          <p:cNvPr id="4" name="Subtitle 3">
+            <a:extLst>
+              <a:ext uri="{FF2B5EF4-FFF2-40B4-BE49-F238E27FC236}">
+                <a16:creationId xmlns:a16="http://schemas.microsoft.com/office/drawing/2014/main" id="{3AE379D4-A694-42E9-9153-9F2034381357}"/>
+              </a:ext>
+            </a:extLst>
+          </p:cNvPr>
+          <p:cNvSpPr>
+            <a:spLocks noGrp="1"/>
+          </p:cNvSpPr>
+          <p:nvPr>
+            <p:ph type="subTitle" idx="1"/>
+          </p:nvPr>
+        </p:nvSpPr>
+        <p:spPr/>
+        <p:txBody>
+          <a:bodyPr/>
+          <a:lstStyle/>
+          <a:p>
+            <a:endParaRPr lang="en-US"/>
+          </a:p>
+        </p:txBody>
+      </p:sp>
+    </p:spTree>
+    <p:extLst>
+      <p:ext uri="{BB962C8B-B14F-4D97-AF65-F5344CB8AC3E}">
+        <p14:creationId xmlns:p14="http://schemas.microsoft.com/office/powerpoint/2010/main" val="304274505"/>
       </p:ext>
     </p:extLst>
   </p:cSld>
@@ -4342,31 +4467,41 @@
           </a:p>
         </p:txBody>
       </p:sp>
-      <p:sp>
-        <p:nvSpPr>
-          <p:cNvPr id="4" name="Content Placeholder 3">
+      <p:pic>
+        <p:nvPicPr>
+          <p:cNvPr id="6" name="Content Placeholder 5">
             <a:extLst>
               <a:ext uri="{FF2B5EF4-FFF2-40B4-BE49-F238E27FC236}">
-                <a16:creationId xmlns:a16="http://schemas.microsoft.com/office/drawing/2014/main" id="{DB3A3843-011E-4120-ABC0-954BA262F2E1}"/>
+                <a16:creationId xmlns:a16="http://schemas.microsoft.com/office/drawing/2014/main" id="{19891CC7-EAF0-4DFC-8516-7CADD0FEA7B8}"/>
               </a:ext>
             </a:extLst>
           </p:cNvPr>
-          <p:cNvSpPr>
-            <a:spLocks noGrp="1"/>
-          </p:cNvSpPr>
+          <p:cNvPicPr>
+            <a:picLocks noGrp="1" noChangeAspect="1"/>
+          </p:cNvPicPr>
           <p:nvPr>
             <p:ph idx="1"/>
           </p:nvPr>
-        </p:nvSpPr>
-        <p:spPr/>
-        <p:txBody>
-          <a:bodyPr/>
-          <a:lstStyle/>
-          <a:p>
-            <a:endParaRPr lang="en-US"/>
-          </a:p>
-        </p:txBody>
-      </p:sp>
+        </p:nvPicPr>
+        <p:blipFill>
+          <a:blip r:embed="rId2">
+            <a:extLst>
+              <a:ext uri="{28A0092B-C50C-407E-A947-70E740481C1C}">
+                <a14:useLocalDpi xmlns:a14="http://schemas.microsoft.com/office/drawing/2010/main" val="0"/>
+              </a:ext>
+            </a:extLst>
+          </a:blip>
+          <a:stretch>
+            <a:fillRect/>
+          </a:stretch>
+        </p:blipFill>
+        <p:spPr>
+          <a:xfrm>
+            <a:off x="541020" y="1371600"/>
+            <a:ext cx="7269482" cy="4038600"/>
+          </a:xfrm>
+        </p:spPr>
+      </p:pic>
       <p:sp>
         <p:nvSpPr>
           <p:cNvPr id="5" name="Text Placeholder 4">
@@ -4388,7 +4523,7 @@
           <a:bodyPr/>
           <a:lstStyle/>
           <a:p>
-            <a:endParaRPr lang="en-US"/>
+            <a:endParaRPr lang="en-US" dirty="0"/>
           </a:p>
         </p:txBody>
       </p:sp>
@@ -4462,31 +4597,41 @@
           </a:p>
         </p:txBody>
       </p:sp>
-      <p:sp>
-        <p:nvSpPr>
-          <p:cNvPr id="3" name="Content Placeholder 2">
+      <p:pic>
+        <p:nvPicPr>
+          <p:cNvPr id="6" name="Content Placeholder 5">
             <a:extLst>
               <a:ext uri="{FF2B5EF4-FFF2-40B4-BE49-F238E27FC236}">
-                <a16:creationId xmlns:a16="http://schemas.microsoft.com/office/drawing/2014/main" id="{2FC94CD7-8BDC-441F-8C7B-7BE8554E7B2D}"/>
+                <a16:creationId xmlns:a16="http://schemas.microsoft.com/office/drawing/2014/main" id="{E71C3500-56FB-44EF-B37B-9752DC984E6E}"/>
               </a:ext>
             </a:extLst>
           </p:cNvPr>
-          <p:cNvSpPr>
-            <a:spLocks noGrp="1"/>
-          </p:cNvSpPr>
+          <p:cNvPicPr>
+            <a:picLocks noGrp="1" noChangeAspect="1"/>
+          </p:cNvPicPr>
           <p:nvPr>
             <p:ph idx="1"/>
           </p:nvPr>
-        </p:nvSpPr>
-        <p:spPr/>
-        <p:txBody>
-          <a:bodyPr/>
-          <a:lstStyle/>
-          <a:p>
-            <a:endParaRPr lang="en-US"/>
-          </a:p>
-        </p:txBody>
-      </p:sp>
+        </p:nvPicPr>
+        <p:blipFill>
+          <a:blip r:embed="rId2">
+            <a:extLst>
+              <a:ext uri="{28A0092B-C50C-407E-A947-70E740481C1C}">
+                <a14:useLocalDpi xmlns:a14="http://schemas.microsoft.com/office/drawing/2010/main" val="0"/>
+              </a:ext>
+            </a:extLst>
+          </a:blip>
+          <a:stretch>
+            <a:fillRect/>
+          </a:stretch>
+        </p:blipFill>
+        <p:spPr>
+          <a:xfrm>
+            <a:off x="609601" y="213338"/>
+            <a:ext cx="7298480" cy="3097675"/>
+          </a:xfrm>
+        </p:spPr>
+      </p:pic>
       <p:sp>
         <p:nvSpPr>
           <p:cNvPr id="4" name="Text Placeholder 3">
@@ -4512,6 +4657,42 @@
           </a:p>
         </p:txBody>
       </p:sp>
+      <p:pic>
+        <p:nvPicPr>
+          <p:cNvPr id="8" name="Picture 7">
+            <a:extLst>
+              <a:ext uri="{FF2B5EF4-FFF2-40B4-BE49-F238E27FC236}">
+                <a16:creationId xmlns:a16="http://schemas.microsoft.com/office/drawing/2014/main" id="{9F9BEF9A-E985-4494-A8AF-254AD0D9D4A4}"/>
+              </a:ext>
+            </a:extLst>
+          </p:cNvPr>
+          <p:cNvPicPr>
+            <a:picLocks noChangeAspect="1"/>
+          </p:cNvPicPr>
+          <p:nvPr/>
+        </p:nvPicPr>
+        <p:blipFill>
+          <a:blip r:embed="rId3">
+            <a:extLst>
+              <a:ext uri="{28A0092B-C50C-407E-A947-70E740481C1C}">
+                <a14:useLocalDpi xmlns:a14="http://schemas.microsoft.com/office/drawing/2010/main" val="0"/>
+              </a:ext>
+            </a:extLst>
+          </a:blip>
+          <a:stretch>
+            <a:fillRect/>
+          </a:stretch>
+        </p:blipFill>
+        <p:spPr>
+          <a:xfrm>
+            <a:off x="609601" y="3311013"/>
+            <a:ext cx="7315200" cy="3104773"/>
+          </a:xfrm>
+          <a:prstGeom prst="rect">
+            <a:avLst/>
+          </a:prstGeom>
+        </p:spPr>
+      </p:pic>
     </p:spTree>
     <p:extLst>
       <p:ext uri="{BB962C8B-B14F-4D97-AF65-F5344CB8AC3E}">
@@ -4582,31 +4763,41 @@
           </a:p>
         </p:txBody>
       </p:sp>
-      <p:sp>
-        <p:nvSpPr>
-          <p:cNvPr id="3" name="Content Placeholder 2">
+      <p:pic>
+        <p:nvPicPr>
+          <p:cNvPr id="8" name="Content Placeholder 7">
             <a:extLst>
               <a:ext uri="{FF2B5EF4-FFF2-40B4-BE49-F238E27FC236}">
-                <a16:creationId xmlns:a16="http://schemas.microsoft.com/office/drawing/2014/main" id="{AF16D378-7C4F-454A-9193-44682F87B1EB}"/>
+                <a16:creationId xmlns:a16="http://schemas.microsoft.com/office/drawing/2014/main" id="{E72AE726-D05F-45E3-9171-2F394C515789}"/>
               </a:ext>
             </a:extLst>
           </p:cNvPr>
-          <p:cNvSpPr>
-            <a:spLocks noGrp="1"/>
-          </p:cNvSpPr>
+          <p:cNvPicPr>
+            <a:picLocks noGrp="1" noChangeAspect="1"/>
+          </p:cNvPicPr>
           <p:nvPr>
             <p:ph idx="1"/>
           </p:nvPr>
-        </p:nvSpPr>
-        <p:spPr/>
-        <p:txBody>
-          <a:bodyPr/>
-          <a:lstStyle/>
-          <a:p>
-            <a:endParaRPr lang="en-US"/>
-          </a:p>
-        </p:txBody>
-      </p:sp>
+        </p:nvPicPr>
+        <p:blipFill>
+          <a:blip r:embed="rId2">
+            <a:extLst>
+              <a:ext uri="{28A0092B-C50C-407E-A947-70E740481C1C}">
+                <a14:useLocalDpi xmlns:a14="http://schemas.microsoft.com/office/drawing/2010/main" val="0"/>
+              </a:ext>
+            </a:extLst>
+          </a:blip>
+          <a:stretch>
+            <a:fillRect/>
+          </a:stretch>
+        </p:blipFill>
+        <p:spPr>
+          <a:xfrm>
+            <a:off x="179124" y="1295400"/>
+            <a:ext cx="7745676" cy="3570975"/>
+          </a:xfrm>
+        </p:spPr>
+      </p:pic>
       <p:sp>
         <p:nvSpPr>
           <p:cNvPr id="4" name="Text Placeholder 3">
@@ -4628,7 +4819,10 @@
           <a:bodyPr/>
           <a:lstStyle/>
           <a:p>
-            <a:endParaRPr lang="en-US"/>
+            <a:r>
+              <a:rPr lang="en-US" dirty="0"/>
+              <a:t>Education</a:t>
+            </a:r>
           </a:p>
         </p:txBody>
       </p:sp>
@@ -4676,10 +4870,10 @@
       </p:grpSpPr>
       <p:sp>
         <p:nvSpPr>
-          <p:cNvPr id="5" name="Title 4">
+          <p:cNvPr id="2" name="Title 1">
             <a:extLst>
               <a:ext uri="{FF2B5EF4-FFF2-40B4-BE49-F238E27FC236}">
-                <a16:creationId xmlns:a16="http://schemas.microsoft.com/office/drawing/2014/main" id="{60928B2D-6D8A-4A34-B883-8AF2366CA4ED}"/>
+                <a16:creationId xmlns:a16="http://schemas.microsoft.com/office/drawing/2014/main" id="{81DB3431-6291-4D88-96BE-B787DF56C10A}"/>
               </a:ext>
             </a:extLst>
           </p:cNvPr>
@@ -4697,25 +4891,60 @@
           <a:p>
             <a:r>
               <a:rPr lang="en-US" dirty="0"/>
-              <a:t>Data Cleanup &amp; Exploration</a:t>
-            </a:r>
-          </a:p>
-        </p:txBody>
-      </p:sp>
-      <p:sp>
-        <p:nvSpPr>
+              <a:t>Question 3: Demographic Changes</a:t>
+            </a:r>
+          </a:p>
+        </p:txBody>
+      </p:sp>
+      <p:pic>
+        <p:nvPicPr>
           <p:cNvPr id="6" name="Content Placeholder 5">
             <a:extLst>
               <a:ext uri="{FF2B5EF4-FFF2-40B4-BE49-F238E27FC236}">
-                <a16:creationId xmlns:a16="http://schemas.microsoft.com/office/drawing/2014/main" id="{AEAF33BA-40C5-4D07-85EA-272E84F4C590}"/>
+                <a16:creationId xmlns:a16="http://schemas.microsoft.com/office/drawing/2014/main" id="{9D1D8E82-670D-4AE0-A790-AF9D52FBA889}"/>
               </a:ext>
             </a:extLst>
           </p:cNvPr>
-          <p:cNvSpPr>
-            <a:spLocks noGrp="1"/>
-          </p:cNvSpPr>
+          <p:cNvPicPr>
+            <a:picLocks noGrp="1" noChangeAspect="1"/>
+          </p:cNvPicPr>
           <p:nvPr>
             <p:ph idx="1"/>
+          </p:nvPr>
+        </p:nvPicPr>
+        <p:blipFill>
+          <a:blip r:embed="rId2">
+            <a:extLst>
+              <a:ext uri="{28A0092B-C50C-407E-A947-70E740481C1C}">
+                <a14:useLocalDpi xmlns:a14="http://schemas.microsoft.com/office/drawing/2010/main" val="0"/>
+              </a:ext>
+            </a:extLst>
+          </a:blip>
+          <a:stretch>
+            <a:fillRect/>
+          </a:stretch>
+        </p:blipFill>
+        <p:spPr>
+          <a:xfrm>
+            <a:off x="257244" y="1219200"/>
+            <a:ext cx="7667556" cy="3465985"/>
+          </a:xfrm>
+        </p:spPr>
+      </p:pic>
+      <p:sp>
+        <p:nvSpPr>
+          <p:cNvPr id="4" name="Text Placeholder 3">
+            <a:extLst>
+              <a:ext uri="{FF2B5EF4-FFF2-40B4-BE49-F238E27FC236}">
+                <a16:creationId xmlns:a16="http://schemas.microsoft.com/office/drawing/2014/main" id="{DCC92131-E9C0-4708-9063-2F8C8F124067}"/>
+              </a:ext>
+            </a:extLst>
+          </p:cNvPr>
+          <p:cNvSpPr>
+            <a:spLocks noGrp="1"/>
+          </p:cNvSpPr>
+          <p:nvPr>
+            <p:ph type="body" sz="half" idx="2"/>
           </p:nvPr>
         </p:nvSpPr>
         <p:spPr/>
@@ -4725,19 +4954,7 @@
           <a:p>
             <a:r>
               <a:rPr lang="en-US" dirty="0"/>
-              <a:t>Methods of getting the data</a:t>
-            </a:r>
-          </a:p>
-          <a:p>
-            <a:r>
-              <a:rPr lang="en-US" dirty="0"/>
-              <a:t>Exploring, limiting in range etc.</a:t>
-            </a:r>
-          </a:p>
-          <a:p>
-            <a:r>
-              <a:rPr lang="en-US" dirty="0"/>
-              <a:t>Any interesting findings?</a:t>
+              <a:t>Race</a:t>
             </a:r>
           </a:p>
         </p:txBody>
@@ -4745,7 +4962,7 @@
     </p:spTree>
     <p:extLst>
       <p:ext uri="{BB962C8B-B14F-4D97-AF65-F5344CB8AC3E}">
-        <p14:creationId xmlns:p14="http://schemas.microsoft.com/office/powerpoint/2010/main" val="3589475554"/>
+        <p14:creationId xmlns:p14="http://schemas.microsoft.com/office/powerpoint/2010/main" val="707463969"/>
       </p:ext>
     </p:extLst>
   </p:cSld>
@@ -4789,7 +5006,7 @@
           <p:cNvPr id="2" name="Title 1">
             <a:extLst>
               <a:ext uri="{FF2B5EF4-FFF2-40B4-BE49-F238E27FC236}">
-                <a16:creationId xmlns:a16="http://schemas.microsoft.com/office/drawing/2014/main" id="{0487450A-6263-4AF1-AB5A-BC5B71106A69}"/>
+                <a16:creationId xmlns:a16="http://schemas.microsoft.com/office/drawing/2014/main" id="{81DB3431-6291-4D88-96BE-B787DF56C10A}"/>
               </a:ext>
             </a:extLst>
           </p:cNvPr>
@@ -4807,25 +5024,60 @@
           <a:p>
             <a:r>
               <a:rPr lang="en-US" dirty="0"/>
-              <a:t>General Discussion</a:t>
-            </a:r>
-          </a:p>
-        </p:txBody>
-      </p:sp>
-      <p:sp>
-        <p:nvSpPr>
-          <p:cNvPr id="3" name="Content Placeholder 2">
+              <a:t>Question 3: Demographic Changes</a:t>
+            </a:r>
+          </a:p>
+        </p:txBody>
+      </p:sp>
+      <p:pic>
+        <p:nvPicPr>
+          <p:cNvPr id="6" name="Content Placeholder 5">
             <a:extLst>
               <a:ext uri="{FF2B5EF4-FFF2-40B4-BE49-F238E27FC236}">
-                <a16:creationId xmlns:a16="http://schemas.microsoft.com/office/drawing/2014/main" id="{ED1DD521-BB87-4F9A-BC76-6224F6FA9E1D}"/>
+                <a16:creationId xmlns:a16="http://schemas.microsoft.com/office/drawing/2014/main" id="{E20BB6C7-54AE-4F0B-B0DD-9BB776946DBF}"/>
               </a:ext>
             </a:extLst>
           </p:cNvPr>
-          <p:cNvSpPr>
-            <a:spLocks noGrp="1"/>
-          </p:cNvSpPr>
+          <p:cNvPicPr>
+            <a:picLocks noGrp="1" noChangeAspect="1"/>
+          </p:cNvPicPr>
           <p:nvPr>
             <p:ph idx="1"/>
+          </p:nvPr>
+        </p:nvPicPr>
+        <p:blipFill>
+          <a:blip r:embed="rId2">
+            <a:extLst>
+              <a:ext uri="{28A0092B-C50C-407E-A947-70E740481C1C}">
+                <a14:useLocalDpi xmlns:a14="http://schemas.microsoft.com/office/drawing/2010/main" val="0"/>
+              </a:ext>
+            </a:extLst>
+          </a:blip>
+          <a:stretch>
+            <a:fillRect/>
+          </a:stretch>
+        </p:blipFill>
+        <p:spPr>
+          <a:xfrm>
+            <a:off x="304800" y="1219200"/>
+            <a:ext cx="7555892" cy="3635265"/>
+          </a:xfrm>
+        </p:spPr>
+      </p:pic>
+      <p:sp>
+        <p:nvSpPr>
+          <p:cNvPr id="4" name="Text Placeholder 3">
+            <a:extLst>
+              <a:ext uri="{FF2B5EF4-FFF2-40B4-BE49-F238E27FC236}">
+                <a16:creationId xmlns:a16="http://schemas.microsoft.com/office/drawing/2014/main" id="{DCC92131-E9C0-4708-9063-2F8C8F124067}"/>
+              </a:ext>
+            </a:extLst>
+          </p:cNvPr>
+          <p:cNvSpPr>
+            <a:spLocks noGrp="1"/>
+          </p:cNvSpPr>
+          <p:nvPr>
+            <p:ph type="body" sz="half" idx="2"/>
           </p:nvPr>
         </p:nvSpPr>
         <p:spPr/>
@@ -4833,14 +5085,17 @@
           <a:bodyPr/>
           <a:lstStyle/>
           <a:p>
-            <a:endParaRPr lang="en-US"/>
+            <a:r>
+              <a:rPr lang="en-US" dirty="0"/>
+              <a:t>Age Range</a:t>
+            </a:r>
           </a:p>
         </p:txBody>
       </p:sp>
     </p:spTree>
     <p:extLst>
       <p:ext uri="{BB962C8B-B14F-4D97-AF65-F5344CB8AC3E}">
-        <p14:creationId xmlns:p14="http://schemas.microsoft.com/office/powerpoint/2010/main" val="2018918246"/>
+        <p14:creationId xmlns:p14="http://schemas.microsoft.com/office/powerpoint/2010/main" val="1181949973"/>
       </p:ext>
     </p:extLst>
   </p:cSld>
@@ -4881,10 +5136,10 @@
       </p:grpSpPr>
       <p:sp>
         <p:nvSpPr>
-          <p:cNvPr id="2" name="Title 1">
+          <p:cNvPr id="5" name="Title 4">
             <a:extLst>
               <a:ext uri="{FF2B5EF4-FFF2-40B4-BE49-F238E27FC236}">
-                <a16:creationId xmlns:a16="http://schemas.microsoft.com/office/drawing/2014/main" id="{4A976F62-38FC-4B90-8209-4C25001787FC}"/>
+                <a16:creationId xmlns:a16="http://schemas.microsoft.com/office/drawing/2014/main" id="{60928B2D-6D8A-4A34-B883-8AF2366CA4ED}"/>
               </a:ext>
             </a:extLst>
           </p:cNvPr>
@@ -4902,17 +5157,17 @@
           <a:p>
             <a:r>
               <a:rPr lang="en-US" dirty="0"/>
-              <a:t>Post Mortem</a:t>
-            </a:r>
-          </a:p>
-        </p:txBody>
-      </p:sp>
-      <p:sp>
-        <p:nvSpPr>
-          <p:cNvPr id="3" name="Content Placeholder 2">
+              <a:t>Data Cleanup &amp; Exploration</a:t>
+            </a:r>
+          </a:p>
+        </p:txBody>
+      </p:sp>
+      <p:sp>
+        <p:nvSpPr>
+          <p:cNvPr id="6" name="Content Placeholder 5">
             <a:extLst>
               <a:ext uri="{FF2B5EF4-FFF2-40B4-BE49-F238E27FC236}">
-                <a16:creationId xmlns:a16="http://schemas.microsoft.com/office/drawing/2014/main" id="{2730CC84-5563-4FF8-9ABA-99712EB5C434}"/>
+                <a16:creationId xmlns:a16="http://schemas.microsoft.com/office/drawing/2014/main" id="{AEAF33BA-40C5-4D07-85EA-272E84F4C590}"/>
               </a:ext>
             </a:extLst>
           </p:cNvPr>
@@ -4930,19 +5185,19 @@
           <a:p>
             <a:r>
               <a:rPr lang="en-US" dirty="0"/>
-              <a:t>Discuss any difficulties that arose, and how you dealt with them</a:t>
+              <a:t>Methods of getting the data</a:t>
             </a:r>
           </a:p>
           <a:p>
             <a:r>
               <a:rPr lang="en-US" dirty="0"/>
-              <a:t>Discuss any additional questions that came up, but which you didn't have time to answer: What would you research next, if you had two more weeks?</a:t>
+              <a:t>Exploring, limiting in range etc.</a:t>
             </a:r>
           </a:p>
           <a:p>
             <a:r>
               <a:rPr lang="en-US" dirty="0"/>
-              <a:t>Basically acknowledge limitations</a:t>
+              <a:t>Any interesting findings?</a:t>
             </a:r>
           </a:p>
         </p:txBody>
@@ -4950,7 +5205,7 @@
     </p:spTree>
     <p:extLst>
       <p:ext uri="{BB962C8B-B14F-4D97-AF65-F5344CB8AC3E}">
-        <p14:creationId xmlns:p14="http://schemas.microsoft.com/office/powerpoint/2010/main" val="1690957519"/>
+        <p14:creationId xmlns:p14="http://schemas.microsoft.com/office/powerpoint/2010/main" val="3589475554"/>
       </p:ext>
     </p:extLst>
   </p:cSld>
@@ -4994,7 +5249,7 @@
           <p:cNvPr id="2" name="Title 1">
             <a:extLst>
               <a:ext uri="{FF2B5EF4-FFF2-40B4-BE49-F238E27FC236}">
-                <a16:creationId xmlns:a16="http://schemas.microsoft.com/office/drawing/2014/main" id="{0CD2D5C9-5FA3-43AC-A9F0-864EB45FA257}"/>
+                <a16:creationId xmlns:a16="http://schemas.microsoft.com/office/drawing/2014/main" id="{4A976F62-38FC-4B90-8209-4C25001787FC}"/>
               </a:ext>
             </a:extLst>
           </p:cNvPr>
@@ -5002,7 +5257,7 @@
             <a:spLocks noGrp="1"/>
           </p:cNvSpPr>
           <p:nvPr>
-            <p:ph type="ctrTitle"/>
+            <p:ph type="title"/>
           </p:nvPr>
         </p:nvSpPr>
         <p:spPr/>
@@ -5012,17 +5267,17 @@
           <a:p>
             <a:r>
               <a:rPr lang="en-US" dirty="0"/>
-              <a:t>Questions &amp; Answers</a:t>
-            </a:r>
-          </a:p>
-        </p:txBody>
-      </p:sp>
-      <p:sp>
-        <p:nvSpPr>
-          <p:cNvPr id="4" name="Subtitle 3">
+              <a:t>Post Mortem</a:t>
+            </a:r>
+          </a:p>
+        </p:txBody>
+      </p:sp>
+      <p:sp>
+        <p:nvSpPr>
+          <p:cNvPr id="3" name="Content Placeholder 2">
             <a:extLst>
               <a:ext uri="{FF2B5EF4-FFF2-40B4-BE49-F238E27FC236}">
-                <a16:creationId xmlns:a16="http://schemas.microsoft.com/office/drawing/2014/main" id="{3AE379D4-A694-42E9-9153-9F2034381357}"/>
+                <a16:creationId xmlns:a16="http://schemas.microsoft.com/office/drawing/2014/main" id="{2730CC84-5563-4FF8-9ABA-99712EB5C434}"/>
               </a:ext>
             </a:extLst>
           </p:cNvPr>
@@ -5030,7 +5285,7 @@
             <a:spLocks noGrp="1"/>
           </p:cNvSpPr>
           <p:nvPr>
-            <p:ph type="subTitle" idx="1"/>
+            <p:ph idx="1"/>
           </p:nvPr>
         </p:nvSpPr>
         <p:spPr/>
@@ -5038,14 +5293,29 @@
           <a:bodyPr/>
           <a:lstStyle/>
           <a:p>
-            <a:endParaRPr lang="en-US"/>
+            <a:r>
+              <a:rPr lang="en-US" dirty="0"/>
+              <a:t>Discuss any difficulties that arose, and how you dealt with them</a:t>
+            </a:r>
+          </a:p>
+          <a:p>
+            <a:r>
+              <a:rPr lang="en-US" dirty="0"/>
+              <a:t>Discuss any additional questions that came up, but which you didn't have time to answer: What would you research next, if you had two more weeks?</a:t>
+            </a:r>
+          </a:p>
+          <a:p>
+            <a:r>
+              <a:rPr lang="en-US" dirty="0"/>
+              <a:t>Basically acknowledge limitations</a:t>
+            </a:r>
           </a:p>
         </p:txBody>
       </p:sp>
     </p:spTree>
     <p:extLst>
       <p:ext uri="{BB962C8B-B14F-4D97-AF65-F5344CB8AC3E}">
-        <p14:creationId xmlns:p14="http://schemas.microsoft.com/office/powerpoint/2010/main" val="304274505"/>
+        <p14:creationId xmlns:p14="http://schemas.microsoft.com/office/powerpoint/2010/main" val="1690957519"/>
       </p:ext>
     </p:extLst>
   </p:cSld>

</xml_diff>

<commit_message>
adding summary from Dolly. modifying text based slides, minor formatting of plot slide titles
</commit_message>
<xml_diff>
--- a/Housing in Orange County, FL.pptx
+++ b/Housing in Orange County, FL.pptx
@@ -5,22 +5,24 @@
     <p:sldMasterId id="2147483648" r:id="rId1"/>
   </p:sldMasterIdLst>
   <p:notesMasterIdLst>
-    <p:notesMasterId r:id="rId12"/>
+    <p:notesMasterId r:id="rId14"/>
   </p:notesMasterIdLst>
   <p:handoutMasterIdLst>
-    <p:handoutMasterId r:id="rId13"/>
+    <p:handoutMasterId r:id="rId15"/>
   </p:handoutMasterIdLst>
   <p:sldIdLst>
     <p:sldId id="256" r:id="rId2"/>
     <p:sldId id="257" r:id="rId3"/>
-    <p:sldId id="258" r:id="rId4"/>
-    <p:sldId id="259" r:id="rId5"/>
-    <p:sldId id="260" r:id="rId6"/>
-    <p:sldId id="265" r:id="rId7"/>
-    <p:sldId id="266" r:id="rId8"/>
-    <p:sldId id="261" r:id="rId9"/>
-    <p:sldId id="263" r:id="rId10"/>
-    <p:sldId id="264" r:id="rId11"/>
+    <p:sldId id="268" r:id="rId4"/>
+    <p:sldId id="258" r:id="rId5"/>
+    <p:sldId id="259" r:id="rId6"/>
+    <p:sldId id="260" r:id="rId7"/>
+    <p:sldId id="265" r:id="rId8"/>
+    <p:sldId id="266" r:id="rId9"/>
+    <p:sldId id="261" r:id="rId10"/>
+    <p:sldId id="263" r:id="rId11"/>
+    <p:sldId id="267" r:id="rId12"/>
+    <p:sldId id="264" r:id="rId13"/>
   </p:sldIdLst>
   <p:sldSz cx="12192000" cy="6858000"/>
   <p:notesSz cx="6858000" cy="9144000"/>
@@ -241,7 +243,7 @@
           <a:p>
             <a:fld id="{061C5132-FFA3-4B02-9F09-22FCF40EFA74}" type="datetimeFigureOut">
               <a:rPr lang="en-US" smtClean="0"/>
-              <a:t>3/7/2019</a:t>
+              <a:t>3/8/2019</a:t>
             </a:fld>
             <a:endParaRPr lang="en-US"/>
           </a:p>
@@ -406,7 +408,7 @@
           <a:p>
             <a:fld id="{0B6E42C9-243F-4DC5-AFF6-9D56B5FA9D63}" type="datetimeFigureOut">
               <a:rPr lang="en-US" smtClean="0"/>
-              <a:t>3/7/2019</a:t>
+              <a:t>3/8/2019</a:t>
             </a:fld>
             <a:endParaRPr lang="en-US"/>
           </a:p>
@@ -1010,7 +1012,7 @@
           <a:p>
             <a:fld id="{B0FE2824-C2A0-4931-BB32-60B24BDBB3CC}" type="datetimeFigureOut">
               <a:rPr lang="en-US" smtClean="0"/>
-              <a:t>3/7/2019</a:t>
+              <a:t>3/8/2019</a:t>
             </a:fld>
             <a:endParaRPr lang="en-US"/>
           </a:p>
@@ -1205,7 +1207,7 @@
           <a:p>
             <a:fld id="{B0FE2824-C2A0-4931-BB32-60B24BDBB3CC}" type="datetimeFigureOut">
               <a:rPr lang="en-US" smtClean="0"/>
-              <a:t>3/7/2019</a:t>
+              <a:t>3/8/2019</a:t>
             </a:fld>
             <a:endParaRPr lang="en-US"/>
           </a:p>
@@ -1385,7 +1387,7 @@
           <a:p>
             <a:fld id="{B0FE2824-C2A0-4931-BB32-60B24BDBB3CC}" type="datetimeFigureOut">
               <a:rPr lang="en-US" smtClean="0"/>
-              <a:t>3/7/2019</a:t>
+              <a:t>3/8/2019</a:t>
             </a:fld>
             <a:endParaRPr lang="en-US"/>
           </a:p>
@@ -1905,7 +1907,7 @@
           <a:p>
             <a:fld id="{B0FE2824-C2A0-4931-BB32-60B24BDBB3CC}" type="datetimeFigureOut">
               <a:rPr lang="en-US" smtClean="0"/>
-              <a:t>3/7/2019</a:t>
+              <a:t>3/8/2019</a:t>
             </a:fld>
             <a:endParaRPr lang="en-US"/>
           </a:p>
@@ -2347,7 +2349,7 @@
           <a:p>
             <a:fld id="{B0FE2824-C2A0-4931-BB32-60B24BDBB3CC}" type="datetimeFigureOut">
               <a:rPr lang="en-US" smtClean="0"/>
-              <a:t>3/7/2019</a:t>
+              <a:t>3/8/2019</a:t>
             </a:fld>
             <a:endParaRPr lang="en-US"/>
           </a:p>
@@ -2476,7 +2478,7 @@
           <a:p>
             <a:fld id="{B0FE2824-C2A0-4931-BB32-60B24BDBB3CC}" type="datetimeFigureOut">
               <a:rPr lang="en-US" smtClean="0"/>
-              <a:t>3/7/2019</a:t>
+              <a:t>3/8/2019</a:t>
             </a:fld>
             <a:endParaRPr lang="en-US"/>
           </a:p>
@@ -2583,7 +2585,7 @@
           <a:p>
             <a:fld id="{B0FE2824-C2A0-4931-BB32-60B24BDBB3CC}" type="datetimeFigureOut">
               <a:rPr lang="en-US" smtClean="0"/>
-              <a:t>3/7/2019</a:t>
+              <a:t>3/8/2019</a:t>
             </a:fld>
             <a:endParaRPr lang="en-US"/>
           </a:p>
@@ -2879,7 +2881,7 @@
           <a:p>
             <a:fld id="{B0FE2824-C2A0-4931-BB32-60B24BDBB3CC}" type="datetimeFigureOut">
               <a:rPr lang="en-US" smtClean="0"/>
-              <a:t>3/7/2019</a:t>
+              <a:t>3/8/2019</a:t>
             </a:fld>
             <a:endParaRPr lang="en-US"/>
           </a:p>
@@ -3152,7 +3154,7 @@
           <a:p>
             <a:fld id="{B0FE2824-C2A0-4931-BB32-60B24BDBB3CC}" type="datetimeFigureOut">
               <a:rPr lang="en-US" smtClean="0"/>
-              <a:t>3/7/2019</a:t>
+              <a:t>3/8/2019</a:t>
             </a:fld>
             <a:endParaRPr lang="en-US"/>
           </a:p>
@@ -3446,7 +3448,7 @@
             <a:fld id="{B0FE2824-C2A0-4931-BB32-60B24BDBB3CC}" type="datetimeFigureOut">
               <a:rPr lang="en-US" smtClean="0"/>
               <a:pPr/>
-              <a:t>3/7/2019</a:t>
+              <a:t>3/8/2019</a:t>
             </a:fld>
             <a:endParaRPr lang="en-US"/>
           </a:p>
@@ -4283,6 +4285,917 @@
           <p:cNvPr id="2" name="Title 1">
             <a:extLst>
               <a:ext uri="{FF2B5EF4-FFF2-40B4-BE49-F238E27FC236}">
+                <a16:creationId xmlns:a16="http://schemas.microsoft.com/office/drawing/2014/main" id="{4A976F62-38FC-4B90-8209-4C25001787FC}"/>
+              </a:ext>
+            </a:extLst>
+          </p:cNvPr>
+          <p:cNvSpPr>
+            <a:spLocks noGrp="1"/>
+          </p:cNvSpPr>
+          <p:nvPr>
+            <p:ph type="title"/>
+          </p:nvPr>
+        </p:nvSpPr>
+        <p:spPr/>
+        <p:txBody>
+          <a:bodyPr/>
+          <a:lstStyle/>
+          <a:p>
+            <a:r>
+              <a:rPr lang="en-US" dirty="0"/>
+              <a:t>Limitations and Follow up questions</a:t>
+            </a:r>
+          </a:p>
+        </p:txBody>
+      </p:sp>
+      <p:sp>
+        <p:nvSpPr>
+          <p:cNvPr id="3" name="Content Placeholder 2">
+            <a:extLst>
+              <a:ext uri="{FF2B5EF4-FFF2-40B4-BE49-F238E27FC236}">
+                <a16:creationId xmlns:a16="http://schemas.microsoft.com/office/drawing/2014/main" id="{2730CC84-5563-4FF8-9ABA-99712EB5C434}"/>
+              </a:ext>
+            </a:extLst>
+          </p:cNvPr>
+          <p:cNvSpPr>
+            <a:spLocks noGrp="1"/>
+          </p:cNvSpPr>
+          <p:nvPr>
+            <p:ph idx="1"/>
+          </p:nvPr>
+        </p:nvSpPr>
+        <p:spPr>
+          <a:xfrm>
+            <a:off x="838200" y="1825625"/>
+            <a:ext cx="10515600" cy="2985450"/>
+          </a:xfrm>
+        </p:spPr>
+        <p:txBody>
+          <a:bodyPr>
+            <a:normAutofit/>
+          </a:bodyPr>
+          <a:lstStyle/>
+          <a:p>
+            <a:r>
+              <a:rPr lang="en-US" dirty="0"/>
+              <a:t>Choosing a single US Census API, understanding documentation, and how it worked</a:t>
+            </a:r>
+          </a:p>
+          <a:p>
+            <a:r>
+              <a:rPr lang="en-US" dirty="0"/>
+              <a:t>The lack of overlapping years between the MLS and US Census</a:t>
+            </a:r>
+          </a:p>
+          <a:p>
+            <a:r>
+              <a:rPr lang="en-US" dirty="0"/>
+              <a:t>Meshing different types of data: Private vs Rental, Family vs Non-Family</a:t>
+            </a:r>
+          </a:p>
+          <a:p>
+            <a:r>
+              <a:rPr lang="en-US" dirty="0"/>
+              <a:t>Accessing data sets that were summaries vs individual data points</a:t>
+            </a:r>
+          </a:p>
+          <a:p>
+            <a:r>
+              <a:rPr lang="en-US" dirty="0"/>
+              <a:t>Questions of interest but out of scope: </a:t>
+            </a:r>
+          </a:p>
+          <a:p>
+            <a:endParaRPr lang="en-US" dirty="0"/>
+          </a:p>
+        </p:txBody>
+      </p:sp>
+      <p:sp>
+        <p:nvSpPr>
+          <p:cNvPr id="4" name="Content Placeholder 2">
+            <a:extLst>
+              <a:ext uri="{FF2B5EF4-FFF2-40B4-BE49-F238E27FC236}">
+                <a16:creationId xmlns:a16="http://schemas.microsoft.com/office/drawing/2014/main" id="{624236E4-8C72-4544-B7BD-CBECADC27D2E}"/>
+              </a:ext>
+            </a:extLst>
+          </p:cNvPr>
+          <p:cNvSpPr txBox="1">
+            <a:spLocks/>
+          </p:cNvSpPr>
+          <p:nvPr/>
+        </p:nvSpPr>
+        <p:spPr>
+          <a:xfrm>
+            <a:off x="990600" y="4407687"/>
+            <a:ext cx="10832592" cy="1437326"/>
+          </a:xfrm>
+          <a:prstGeom prst="rect">
+            <a:avLst/>
+          </a:prstGeom>
+        </p:spPr>
+        <p:txBody>
+          <a:bodyPr vert="horz" lIns="91440" tIns="45720" rIns="91440" bIns="45720" numCol="2" rtlCol="0">
+            <a:normAutofit/>
+          </a:bodyPr>
+          <a:lstStyle>
+            <a:lvl1pPr marL="228600" indent="-228600" algn="l" defTabSz="914400" rtl="0" eaLnBrk="1" latinLnBrk="0" hangingPunct="1">
+              <a:lnSpc>
+                <a:spcPct val="90000"/>
+              </a:lnSpc>
+              <a:spcBef>
+                <a:spcPts val="1800"/>
+              </a:spcBef>
+              <a:buClr>
+                <a:schemeClr val="accent1"/>
+              </a:buClr>
+              <a:buFont typeface="Arial" panose="020B0604020202020204" pitchFamily="34" charset="0"/>
+              <a:buChar char="•"/>
+              <a:defRPr sz="2000" kern="1200">
+                <a:solidFill>
+                  <a:schemeClr val="tx1"/>
+                </a:solidFill>
+                <a:latin typeface="+mn-lt"/>
+                <a:ea typeface="+mn-ea"/>
+                <a:cs typeface="+mn-cs"/>
+              </a:defRPr>
+            </a:lvl1pPr>
+            <a:lvl2pPr marL="457200" indent="-228600" algn="l" defTabSz="914400" rtl="0" eaLnBrk="1" latinLnBrk="0" hangingPunct="1">
+              <a:lnSpc>
+                <a:spcPct val="90000"/>
+              </a:lnSpc>
+              <a:spcBef>
+                <a:spcPts val="1000"/>
+              </a:spcBef>
+              <a:buClr>
+                <a:schemeClr val="accent1"/>
+              </a:buClr>
+              <a:buFont typeface="Arial" panose="020B0604020202020204" pitchFamily="34" charset="0"/>
+              <a:buChar char="•"/>
+              <a:defRPr sz="1800" kern="1200">
+                <a:solidFill>
+                  <a:schemeClr val="tx1"/>
+                </a:solidFill>
+                <a:latin typeface="+mn-lt"/>
+                <a:ea typeface="+mn-ea"/>
+                <a:cs typeface="+mn-cs"/>
+              </a:defRPr>
+            </a:lvl2pPr>
+            <a:lvl3pPr marL="685800" indent="-182880" algn="l" defTabSz="914400" rtl="0" eaLnBrk="1" latinLnBrk="0" hangingPunct="1">
+              <a:lnSpc>
+                <a:spcPct val="90000"/>
+              </a:lnSpc>
+              <a:spcBef>
+                <a:spcPts val="800"/>
+              </a:spcBef>
+              <a:buClr>
+                <a:schemeClr val="accent1"/>
+              </a:buClr>
+              <a:buFont typeface="Arial" panose="020B0604020202020204" pitchFamily="34" charset="0"/>
+              <a:buChar char="•"/>
+              <a:defRPr sz="1600" kern="1200">
+                <a:solidFill>
+                  <a:schemeClr val="tx1"/>
+                </a:solidFill>
+                <a:latin typeface="+mn-lt"/>
+                <a:ea typeface="+mn-ea"/>
+                <a:cs typeface="+mn-cs"/>
+              </a:defRPr>
+            </a:lvl3pPr>
+            <a:lvl4pPr marL="914400" indent="-182880" algn="l" defTabSz="914400" rtl="0" eaLnBrk="1" latinLnBrk="0" hangingPunct="1">
+              <a:lnSpc>
+                <a:spcPct val="90000"/>
+              </a:lnSpc>
+              <a:spcBef>
+                <a:spcPts val="800"/>
+              </a:spcBef>
+              <a:buClr>
+                <a:schemeClr val="accent1"/>
+              </a:buClr>
+              <a:buFont typeface="Arial" panose="020B0604020202020204" pitchFamily="34" charset="0"/>
+              <a:buChar char="•"/>
+              <a:defRPr sz="1400" kern="1200">
+                <a:solidFill>
+                  <a:schemeClr val="tx1"/>
+                </a:solidFill>
+                <a:latin typeface="+mn-lt"/>
+                <a:ea typeface="+mn-ea"/>
+                <a:cs typeface="+mn-cs"/>
+              </a:defRPr>
+            </a:lvl4pPr>
+            <a:lvl5pPr marL="1143000" indent="-182880" algn="l" defTabSz="914400" rtl="0" eaLnBrk="1" latinLnBrk="0" hangingPunct="1">
+              <a:lnSpc>
+                <a:spcPct val="90000"/>
+              </a:lnSpc>
+              <a:spcBef>
+                <a:spcPts val="800"/>
+              </a:spcBef>
+              <a:buClr>
+                <a:schemeClr val="accent1"/>
+              </a:buClr>
+              <a:buFont typeface="Arial" panose="020B0604020202020204" pitchFamily="34" charset="0"/>
+              <a:buChar char="•"/>
+              <a:defRPr sz="1400" kern="1200">
+                <a:solidFill>
+                  <a:schemeClr val="tx1"/>
+                </a:solidFill>
+                <a:latin typeface="+mn-lt"/>
+                <a:ea typeface="+mn-ea"/>
+                <a:cs typeface="+mn-cs"/>
+              </a:defRPr>
+            </a:lvl5pPr>
+            <a:lvl6pPr marL="1371600" indent="-182880" algn="l" defTabSz="914400" rtl="0" eaLnBrk="1" latinLnBrk="0" hangingPunct="1">
+              <a:lnSpc>
+                <a:spcPct val="90000"/>
+              </a:lnSpc>
+              <a:spcBef>
+                <a:spcPts val="800"/>
+              </a:spcBef>
+              <a:buClr>
+                <a:schemeClr val="accent1"/>
+              </a:buClr>
+              <a:buFont typeface="Arial" panose="020B0604020202020204" pitchFamily="34" charset="0"/>
+              <a:buChar char="•"/>
+              <a:defRPr sz="1400" kern="1200">
+                <a:solidFill>
+                  <a:schemeClr val="tx1"/>
+                </a:solidFill>
+                <a:latin typeface="+mn-lt"/>
+                <a:ea typeface="+mn-ea"/>
+                <a:cs typeface="+mn-cs"/>
+              </a:defRPr>
+            </a:lvl6pPr>
+            <a:lvl7pPr marL="1600200" indent="-182880" algn="l" defTabSz="914400" rtl="0" eaLnBrk="1" latinLnBrk="0" hangingPunct="1">
+              <a:lnSpc>
+                <a:spcPct val="90000"/>
+              </a:lnSpc>
+              <a:spcBef>
+                <a:spcPts val="800"/>
+              </a:spcBef>
+              <a:buClr>
+                <a:schemeClr val="accent1"/>
+              </a:buClr>
+              <a:buFont typeface="Arial" panose="020B0604020202020204" pitchFamily="34" charset="0"/>
+              <a:buChar char="•"/>
+              <a:defRPr sz="1400" kern="1200">
+                <a:solidFill>
+                  <a:schemeClr val="tx1"/>
+                </a:solidFill>
+                <a:latin typeface="+mn-lt"/>
+                <a:ea typeface="+mn-ea"/>
+                <a:cs typeface="+mn-cs"/>
+              </a:defRPr>
+            </a:lvl7pPr>
+            <a:lvl8pPr marL="1828800" indent="-182880" algn="l" defTabSz="914400" rtl="0" eaLnBrk="1" latinLnBrk="0" hangingPunct="1">
+              <a:lnSpc>
+                <a:spcPct val="90000"/>
+              </a:lnSpc>
+              <a:spcBef>
+                <a:spcPts val="800"/>
+              </a:spcBef>
+              <a:buClr>
+                <a:schemeClr val="accent1"/>
+              </a:buClr>
+              <a:buFont typeface="Arial" panose="020B0604020202020204" pitchFamily="34" charset="0"/>
+              <a:buChar char="•"/>
+              <a:defRPr sz="1400" kern="1200">
+                <a:solidFill>
+                  <a:schemeClr val="tx1"/>
+                </a:solidFill>
+                <a:latin typeface="+mn-lt"/>
+                <a:ea typeface="+mn-ea"/>
+                <a:cs typeface="+mn-cs"/>
+              </a:defRPr>
+            </a:lvl8pPr>
+            <a:lvl9pPr marL="2057400" indent="-182880" algn="l" defTabSz="914400" rtl="0" eaLnBrk="1" latinLnBrk="0" hangingPunct="1">
+              <a:lnSpc>
+                <a:spcPct val="90000"/>
+              </a:lnSpc>
+              <a:spcBef>
+                <a:spcPts val="800"/>
+              </a:spcBef>
+              <a:buClr>
+                <a:schemeClr val="accent1"/>
+              </a:buClr>
+              <a:buFont typeface="Arial" panose="020B0604020202020204" pitchFamily="34" charset="0"/>
+              <a:buChar char="•"/>
+              <a:defRPr sz="1400" kern="1200">
+                <a:solidFill>
+                  <a:schemeClr val="tx1"/>
+                </a:solidFill>
+                <a:latin typeface="+mn-lt"/>
+                <a:ea typeface="+mn-ea"/>
+                <a:cs typeface="+mn-cs"/>
+              </a:defRPr>
+            </a:lvl9pPr>
+          </a:lstStyle>
+          <a:p>
+            <a:pPr lvl="1"/>
+            <a:r>
+              <a:rPr lang="en-US" dirty="0"/>
+              <a:t>Specific zip codes			</a:t>
+            </a:r>
+          </a:p>
+          <a:p>
+            <a:pPr lvl="1"/>
+            <a:r>
+              <a:rPr lang="en-US" dirty="0"/>
+              <a:t>Political events affecting the markets	</a:t>
+            </a:r>
+          </a:p>
+          <a:p>
+            <a:pPr lvl="1"/>
+            <a:r>
+              <a:rPr lang="en-US" dirty="0"/>
+              <a:t>New industries growing in the area</a:t>
+            </a:r>
+          </a:p>
+          <a:p>
+            <a:pPr lvl="1"/>
+            <a:r>
+              <a:rPr lang="en-US" dirty="0"/>
+              <a:t>More complex demographic profiles </a:t>
+            </a:r>
+          </a:p>
+          <a:p>
+            <a:pPr lvl="1"/>
+            <a:r>
+              <a:rPr lang="en-US" dirty="0"/>
+              <a:t>Effect of returning adult children to the home</a:t>
+            </a:r>
+          </a:p>
+          <a:p>
+            <a:pPr lvl="1"/>
+            <a:r>
+              <a:rPr lang="en-US" dirty="0"/>
+              <a:t>Development patterns	</a:t>
+            </a:r>
+          </a:p>
+        </p:txBody>
+      </p:sp>
+    </p:spTree>
+    <p:extLst>
+      <p:ext uri="{BB962C8B-B14F-4D97-AF65-F5344CB8AC3E}">
+        <p14:creationId xmlns:p14="http://schemas.microsoft.com/office/powerpoint/2010/main" val="1690957519"/>
+      </p:ext>
+    </p:extLst>
+  </p:cSld>
+  <p:clrMapOvr>
+    <a:masterClrMapping/>
+  </p:clrMapOvr>
+  <mc:AlternateContent xmlns:mc="http://schemas.openxmlformats.org/markup-compatibility/2006" xmlns:p14="http://schemas.microsoft.com/office/powerpoint/2010/main">
+    <mc:Choice Requires="p14">
+      <p:transition spd="med" p14:dur="700">
+        <p:fade/>
+      </p:transition>
+    </mc:Choice>
+    <mc:Fallback xmlns="">
+      <p:transition spd="med">
+        <p:fade/>
+      </p:transition>
+    </mc:Fallback>
+  </mc:AlternateContent>
+</p:sld>
+</file>
+
+<file path=ppt/slides/slide11.xml><?xml version="1.0" encoding="utf-8"?>
+<p:sld xmlns:a="http://schemas.openxmlformats.org/drawingml/2006/main" xmlns:r="http://schemas.openxmlformats.org/officeDocument/2006/relationships" xmlns:p="http://schemas.openxmlformats.org/presentationml/2006/main">
+  <p:cSld>
+    <p:spTree>
+      <p:nvGrpSpPr>
+        <p:cNvPr id="1" name=""/>
+        <p:cNvGrpSpPr/>
+        <p:nvPr/>
+      </p:nvGrpSpPr>
+      <p:grpSpPr>
+        <a:xfrm>
+          <a:off x="0" y="0"/>
+          <a:ext cx="0" cy="0"/>
+          <a:chOff x="0" y="0"/>
+          <a:chExt cx="0" cy="0"/>
+        </a:xfrm>
+      </p:grpSpPr>
+      <p:sp>
+        <p:nvSpPr>
+          <p:cNvPr id="2" name="Title 1">
+            <a:extLst>
+              <a:ext uri="{FF2B5EF4-FFF2-40B4-BE49-F238E27FC236}">
+                <a16:creationId xmlns:a16="http://schemas.microsoft.com/office/drawing/2014/main" id="{4A976F62-38FC-4B90-8209-4C25001787FC}"/>
+              </a:ext>
+            </a:extLst>
+          </p:cNvPr>
+          <p:cNvSpPr>
+            <a:spLocks noGrp="1"/>
+          </p:cNvSpPr>
+          <p:nvPr>
+            <p:ph type="title"/>
+          </p:nvPr>
+        </p:nvSpPr>
+        <p:spPr/>
+        <p:txBody>
+          <a:bodyPr/>
+          <a:lstStyle/>
+          <a:p>
+            <a:r>
+              <a:rPr lang="en-US" dirty="0"/>
+              <a:t>Challenges</a:t>
+            </a:r>
+          </a:p>
+        </p:txBody>
+      </p:sp>
+      <p:sp>
+        <p:nvSpPr>
+          <p:cNvPr id="6" name="TextBox 5">
+            <a:extLst>
+              <a:ext uri="{FF2B5EF4-FFF2-40B4-BE49-F238E27FC236}">
+                <a16:creationId xmlns:a16="http://schemas.microsoft.com/office/drawing/2014/main" id="{05F32FF7-4173-4D99-B357-394D1C0E2E14}"/>
+              </a:ext>
+            </a:extLst>
+          </p:cNvPr>
+          <p:cNvSpPr txBox="1"/>
+          <p:nvPr/>
+        </p:nvSpPr>
+        <p:spPr>
+          <a:xfrm>
+            <a:off x="4297682" y="1576864"/>
+            <a:ext cx="6903719" cy="923330"/>
+          </a:xfrm>
+          <a:prstGeom prst="rect">
+            <a:avLst/>
+          </a:prstGeom>
+          <a:noFill/>
+        </p:spPr>
+        <p:txBody>
+          <a:bodyPr wrap="square" rtlCol="0">
+            <a:spAutoFit/>
+          </a:bodyPr>
+          <a:lstStyle/>
+          <a:p>
+            <a:r>
+              <a:rPr lang="en-US" dirty="0"/>
+              <a:t>"Definitely being a novice to APIs and feeling limited in the range of information available.” </a:t>
+            </a:r>
+          </a:p>
+          <a:p>
+            <a:r>
+              <a:rPr lang="en-US" dirty="0"/>
+              <a:t>						- Elizabeth</a:t>
+            </a:r>
+          </a:p>
+        </p:txBody>
+      </p:sp>
+      <p:sp>
+        <p:nvSpPr>
+          <p:cNvPr id="7" name="TextBox 6">
+            <a:extLst>
+              <a:ext uri="{FF2B5EF4-FFF2-40B4-BE49-F238E27FC236}">
+                <a16:creationId xmlns:a16="http://schemas.microsoft.com/office/drawing/2014/main" id="{C1FD966B-F946-4F45-B153-F152E3BC6F43}"/>
+              </a:ext>
+            </a:extLst>
+          </p:cNvPr>
+          <p:cNvSpPr txBox="1"/>
+          <p:nvPr/>
+        </p:nvSpPr>
+        <p:spPr>
+          <a:xfrm>
+            <a:off x="417576" y="3050232"/>
+            <a:ext cx="10972800" cy="1200329"/>
+          </a:xfrm>
+          <a:prstGeom prst="rect">
+            <a:avLst/>
+          </a:prstGeom>
+          <a:noFill/>
+        </p:spPr>
+        <p:txBody>
+          <a:bodyPr wrap="square" rtlCol="0">
+            <a:spAutoFit/>
+          </a:bodyPr>
+          <a:lstStyle/>
+          <a:p>
+            <a:r>
+              <a:rPr lang="en-US" dirty="0"/>
+              <a:t>“…working with multiple people using the </a:t>
+            </a:r>
+            <a:r>
+              <a:rPr lang="en-US" dirty="0" err="1"/>
+              <a:t>Github</a:t>
+            </a:r>
+            <a:r>
+              <a:rPr lang="en-US" dirty="0"/>
+              <a:t> interface… my personal biggest issue on the entire project was figuring out how to keep my branch up to date with the correct version of the master... I struggled with uploading to </a:t>
+            </a:r>
+            <a:r>
+              <a:rPr lang="en-US" dirty="0" err="1"/>
+              <a:t>Github</a:t>
+            </a:r>
+            <a:r>
+              <a:rPr lang="en-US" dirty="0"/>
+              <a:t> more than I did in actually manipulating the data itself.” </a:t>
+            </a:r>
+          </a:p>
+          <a:p>
+            <a:r>
+              <a:rPr lang="en-US" dirty="0"/>
+              <a:t>										- Robert</a:t>
+            </a:r>
+          </a:p>
+        </p:txBody>
+      </p:sp>
+      <p:sp>
+        <p:nvSpPr>
+          <p:cNvPr id="8" name="TextBox 7">
+            <a:extLst>
+              <a:ext uri="{FF2B5EF4-FFF2-40B4-BE49-F238E27FC236}">
+                <a16:creationId xmlns:a16="http://schemas.microsoft.com/office/drawing/2014/main" id="{34334291-89BD-45D3-98F4-A6245570BA70}"/>
+              </a:ext>
+            </a:extLst>
+          </p:cNvPr>
+          <p:cNvSpPr txBox="1"/>
+          <p:nvPr/>
+        </p:nvSpPr>
+        <p:spPr>
+          <a:xfrm>
+            <a:off x="1676400" y="4818886"/>
+            <a:ext cx="7452681" cy="646331"/>
+          </a:xfrm>
+          <a:prstGeom prst="rect">
+            <a:avLst/>
+          </a:prstGeom>
+          <a:noFill/>
+        </p:spPr>
+        <p:txBody>
+          <a:bodyPr wrap="none" rtlCol="0">
+            <a:spAutoFit/>
+          </a:bodyPr>
+          <a:lstStyle/>
+          <a:p>
+            <a:r>
+              <a:rPr lang="en-US" dirty="0"/>
+              <a:t>“Project management and how to approach the delegation of tasks.” </a:t>
+            </a:r>
+          </a:p>
+          <a:p>
+            <a:r>
+              <a:rPr lang="en-US" dirty="0"/>
+              <a:t>						- Dinielle</a:t>
+            </a:r>
+          </a:p>
+        </p:txBody>
+      </p:sp>
+    </p:spTree>
+    <p:extLst>
+      <p:ext uri="{BB962C8B-B14F-4D97-AF65-F5344CB8AC3E}">
+        <p14:creationId xmlns:p14="http://schemas.microsoft.com/office/powerpoint/2010/main" val="3069973228"/>
+      </p:ext>
+    </p:extLst>
+  </p:cSld>
+  <p:clrMapOvr>
+    <a:masterClrMapping/>
+  </p:clrMapOvr>
+  <mc:AlternateContent xmlns:mc="http://schemas.openxmlformats.org/markup-compatibility/2006" xmlns:p14="http://schemas.microsoft.com/office/powerpoint/2010/main">
+    <mc:Choice Requires="p14">
+      <p:transition spd="med" p14:dur="700">
+        <p:fade/>
+      </p:transition>
+    </mc:Choice>
+    <mc:Fallback xmlns="">
+      <p:transition spd="med">
+        <p:fade/>
+      </p:transition>
+    </mc:Fallback>
+  </mc:AlternateContent>
+  <p:timing>
+    <p:tnLst>
+      <p:par>
+        <p:cTn id="1" dur="indefinite" restart="never" nodeType="tmRoot">
+          <p:childTnLst>
+            <p:seq concurrent="1" nextAc="seek">
+              <p:cTn id="2" dur="indefinite" nodeType="mainSeq">
+                <p:childTnLst>
+                  <p:par>
+                    <p:cTn id="3" fill="hold">
+                      <p:stCondLst>
+                        <p:cond delay="indefinite"/>
+                      </p:stCondLst>
+                      <p:childTnLst>
+                        <p:par>
+                          <p:cTn id="4" fill="hold">
+                            <p:stCondLst>
+                              <p:cond delay="0"/>
+                            </p:stCondLst>
+                            <p:childTnLst>
+                              <p:par>
+                                <p:cTn id="5" presetID="2" presetClass="entr" presetSubtype="8" fill="hold" grpId="0" nodeType="clickEffect">
+                                  <p:stCondLst>
+                                    <p:cond delay="0"/>
+                                  </p:stCondLst>
+                                  <p:childTnLst>
+                                    <p:set>
+                                      <p:cBhvr>
+                                        <p:cTn id="6" dur="1" fill="hold">
+                                          <p:stCondLst>
+                                            <p:cond delay="0"/>
+                                          </p:stCondLst>
+                                        </p:cTn>
+                                        <p:tgtEl>
+                                          <p:spTgt spid="6"/>
+                                        </p:tgtEl>
+                                        <p:attrNameLst>
+                                          <p:attrName>style.visibility</p:attrName>
+                                        </p:attrNameLst>
+                                      </p:cBhvr>
+                                      <p:to>
+                                        <p:strVal val="visible"/>
+                                      </p:to>
+                                    </p:set>
+                                    <p:anim calcmode="lin" valueType="num">
+                                      <p:cBhvr additive="base">
+                                        <p:cTn id="7" dur="500" fill="hold"/>
+                                        <p:tgtEl>
+                                          <p:spTgt spid="6"/>
+                                        </p:tgtEl>
+                                        <p:attrNameLst>
+                                          <p:attrName>ppt_x</p:attrName>
+                                        </p:attrNameLst>
+                                      </p:cBhvr>
+                                      <p:tavLst>
+                                        <p:tav tm="0">
+                                          <p:val>
+                                            <p:strVal val="0-#ppt_w/2"/>
+                                          </p:val>
+                                        </p:tav>
+                                        <p:tav tm="100000">
+                                          <p:val>
+                                            <p:strVal val="#ppt_x"/>
+                                          </p:val>
+                                        </p:tav>
+                                      </p:tavLst>
+                                    </p:anim>
+                                    <p:anim calcmode="lin" valueType="num">
+                                      <p:cBhvr additive="base">
+                                        <p:cTn id="8" dur="500" fill="hold"/>
+                                        <p:tgtEl>
+                                          <p:spTgt spid="6"/>
+                                        </p:tgtEl>
+                                        <p:attrNameLst>
+                                          <p:attrName>ppt_y</p:attrName>
+                                        </p:attrNameLst>
+                                      </p:cBhvr>
+                                      <p:tavLst>
+                                        <p:tav tm="0">
+                                          <p:val>
+                                            <p:strVal val="#ppt_y"/>
+                                          </p:val>
+                                        </p:tav>
+                                        <p:tav tm="100000">
+                                          <p:val>
+                                            <p:strVal val="#ppt_y"/>
+                                          </p:val>
+                                        </p:tav>
+                                      </p:tavLst>
+                                    </p:anim>
+                                  </p:childTnLst>
+                                </p:cTn>
+                              </p:par>
+                            </p:childTnLst>
+                          </p:cTn>
+                        </p:par>
+                      </p:childTnLst>
+                    </p:cTn>
+                  </p:par>
+                  <p:par>
+                    <p:cTn id="9" fill="hold">
+                      <p:stCondLst>
+                        <p:cond delay="indefinite"/>
+                      </p:stCondLst>
+                      <p:childTnLst>
+                        <p:par>
+                          <p:cTn id="10" fill="hold">
+                            <p:stCondLst>
+                              <p:cond delay="0"/>
+                            </p:stCondLst>
+                            <p:childTnLst>
+                              <p:par>
+                                <p:cTn id="11" presetID="2" presetClass="entr" presetSubtype="4" fill="hold" grpId="0" nodeType="clickEffect">
+                                  <p:stCondLst>
+                                    <p:cond delay="0"/>
+                                  </p:stCondLst>
+                                  <p:childTnLst>
+                                    <p:set>
+                                      <p:cBhvr>
+                                        <p:cTn id="12" dur="1" fill="hold">
+                                          <p:stCondLst>
+                                            <p:cond delay="0"/>
+                                          </p:stCondLst>
+                                        </p:cTn>
+                                        <p:tgtEl>
+                                          <p:spTgt spid="7"/>
+                                        </p:tgtEl>
+                                        <p:attrNameLst>
+                                          <p:attrName>style.visibility</p:attrName>
+                                        </p:attrNameLst>
+                                      </p:cBhvr>
+                                      <p:to>
+                                        <p:strVal val="visible"/>
+                                      </p:to>
+                                    </p:set>
+                                    <p:anim calcmode="lin" valueType="num">
+                                      <p:cBhvr additive="base">
+                                        <p:cTn id="13" dur="500" fill="hold"/>
+                                        <p:tgtEl>
+                                          <p:spTgt spid="7"/>
+                                        </p:tgtEl>
+                                        <p:attrNameLst>
+                                          <p:attrName>ppt_x</p:attrName>
+                                        </p:attrNameLst>
+                                      </p:cBhvr>
+                                      <p:tavLst>
+                                        <p:tav tm="0">
+                                          <p:val>
+                                            <p:strVal val="#ppt_x"/>
+                                          </p:val>
+                                        </p:tav>
+                                        <p:tav tm="100000">
+                                          <p:val>
+                                            <p:strVal val="#ppt_x"/>
+                                          </p:val>
+                                        </p:tav>
+                                      </p:tavLst>
+                                    </p:anim>
+                                    <p:anim calcmode="lin" valueType="num">
+                                      <p:cBhvr additive="base">
+                                        <p:cTn id="14" dur="500" fill="hold"/>
+                                        <p:tgtEl>
+                                          <p:spTgt spid="7"/>
+                                        </p:tgtEl>
+                                        <p:attrNameLst>
+                                          <p:attrName>ppt_y</p:attrName>
+                                        </p:attrNameLst>
+                                      </p:cBhvr>
+                                      <p:tavLst>
+                                        <p:tav tm="0">
+                                          <p:val>
+                                            <p:strVal val="1+#ppt_h/2"/>
+                                          </p:val>
+                                        </p:tav>
+                                        <p:tav tm="100000">
+                                          <p:val>
+                                            <p:strVal val="#ppt_y"/>
+                                          </p:val>
+                                        </p:tav>
+                                      </p:tavLst>
+                                    </p:anim>
+                                  </p:childTnLst>
+                                </p:cTn>
+                              </p:par>
+                            </p:childTnLst>
+                          </p:cTn>
+                        </p:par>
+                      </p:childTnLst>
+                    </p:cTn>
+                  </p:par>
+                  <p:par>
+                    <p:cTn id="15" fill="hold">
+                      <p:stCondLst>
+                        <p:cond delay="indefinite"/>
+                      </p:stCondLst>
+                      <p:childTnLst>
+                        <p:par>
+                          <p:cTn id="16" fill="hold">
+                            <p:stCondLst>
+                              <p:cond delay="0"/>
+                            </p:stCondLst>
+                            <p:childTnLst>
+                              <p:par>
+                                <p:cTn id="17" presetID="2" presetClass="entr" presetSubtype="2" fill="hold" grpId="0" nodeType="clickEffect">
+                                  <p:stCondLst>
+                                    <p:cond delay="0"/>
+                                  </p:stCondLst>
+                                  <p:childTnLst>
+                                    <p:set>
+                                      <p:cBhvr>
+                                        <p:cTn id="18" dur="1" fill="hold">
+                                          <p:stCondLst>
+                                            <p:cond delay="0"/>
+                                          </p:stCondLst>
+                                        </p:cTn>
+                                        <p:tgtEl>
+                                          <p:spTgt spid="8"/>
+                                        </p:tgtEl>
+                                        <p:attrNameLst>
+                                          <p:attrName>style.visibility</p:attrName>
+                                        </p:attrNameLst>
+                                      </p:cBhvr>
+                                      <p:to>
+                                        <p:strVal val="visible"/>
+                                      </p:to>
+                                    </p:set>
+                                    <p:anim calcmode="lin" valueType="num">
+                                      <p:cBhvr additive="base">
+                                        <p:cTn id="19" dur="500" fill="hold"/>
+                                        <p:tgtEl>
+                                          <p:spTgt spid="8"/>
+                                        </p:tgtEl>
+                                        <p:attrNameLst>
+                                          <p:attrName>ppt_x</p:attrName>
+                                        </p:attrNameLst>
+                                      </p:cBhvr>
+                                      <p:tavLst>
+                                        <p:tav tm="0">
+                                          <p:val>
+                                            <p:strVal val="1+#ppt_w/2"/>
+                                          </p:val>
+                                        </p:tav>
+                                        <p:tav tm="100000">
+                                          <p:val>
+                                            <p:strVal val="#ppt_x"/>
+                                          </p:val>
+                                        </p:tav>
+                                      </p:tavLst>
+                                    </p:anim>
+                                    <p:anim calcmode="lin" valueType="num">
+                                      <p:cBhvr additive="base">
+                                        <p:cTn id="20" dur="500" fill="hold"/>
+                                        <p:tgtEl>
+                                          <p:spTgt spid="8"/>
+                                        </p:tgtEl>
+                                        <p:attrNameLst>
+                                          <p:attrName>ppt_y</p:attrName>
+                                        </p:attrNameLst>
+                                      </p:cBhvr>
+                                      <p:tavLst>
+                                        <p:tav tm="0">
+                                          <p:val>
+                                            <p:strVal val="#ppt_y"/>
+                                          </p:val>
+                                        </p:tav>
+                                        <p:tav tm="100000">
+                                          <p:val>
+                                            <p:strVal val="#ppt_y"/>
+                                          </p:val>
+                                        </p:tav>
+                                      </p:tavLst>
+                                    </p:anim>
+                                  </p:childTnLst>
+                                </p:cTn>
+                              </p:par>
+                            </p:childTnLst>
+                          </p:cTn>
+                        </p:par>
+                      </p:childTnLst>
+                    </p:cTn>
+                  </p:par>
+                </p:childTnLst>
+              </p:cTn>
+              <p:prevCondLst>
+                <p:cond evt="onPrev" delay="0">
+                  <p:tgtEl>
+                    <p:sldTgt/>
+                  </p:tgtEl>
+                </p:cond>
+              </p:prevCondLst>
+              <p:nextCondLst>
+                <p:cond evt="onNext" delay="0">
+                  <p:tgtEl>
+                    <p:sldTgt/>
+                  </p:tgtEl>
+                </p:cond>
+              </p:nextCondLst>
+            </p:seq>
+          </p:childTnLst>
+        </p:cTn>
+      </p:par>
+    </p:tnLst>
+    <p:bldLst>
+      <p:bldP spid="6" grpId="0"/>
+      <p:bldP spid="7" grpId="0"/>
+      <p:bldP spid="8" grpId="0"/>
+    </p:bldLst>
+  </p:timing>
+</p:sld>
+</file>
+
+<file path=ppt/slides/slide12.xml><?xml version="1.0" encoding="utf-8"?>
+<p:sld xmlns:a="http://schemas.openxmlformats.org/drawingml/2006/main" xmlns:r="http://schemas.openxmlformats.org/officeDocument/2006/relationships" xmlns:p="http://schemas.openxmlformats.org/presentationml/2006/main">
+  <p:cSld>
+    <p:spTree>
+      <p:nvGrpSpPr>
+        <p:cNvPr id="1" name=""/>
+        <p:cNvGrpSpPr/>
+        <p:nvPr/>
+      </p:nvGrpSpPr>
+      <p:grpSpPr>
+        <a:xfrm>
+          <a:off x="0" y="0"/>
+          <a:ext cx="0" cy="0"/>
+          <a:chOff x="0" y="0"/>
+          <a:chExt cx="0" cy="0"/>
+        </a:xfrm>
+      </p:grpSpPr>
+      <p:sp>
+        <p:nvSpPr>
+          <p:cNvPr id="2" name="Title 1">
+            <a:extLst>
+              <a:ext uri="{FF2B5EF4-FFF2-40B4-BE49-F238E27FC236}">
                 <a16:creationId xmlns:a16="http://schemas.microsoft.com/office/drawing/2014/main" id="{0CD2D5C9-5FA3-43AC-A9F0-864EB45FA257}"/>
               </a:ext>
             </a:extLst>
@@ -4417,12 +5330,154 @@
             <p:ph idx="1"/>
           </p:nvPr>
         </p:nvSpPr>
-        <p:spPr/>
+        <p:spPr>
+          <a:xfrm>
+            <a:off x="838200" y="1825625"/>
+            <a:ext cx="10515600" cy="2898775"/>
+          </a:xfrm>
+        </p:spPr>
         <p:txBody>
           <a:bodyPr/>
           <a:lstStyle/>
           <a:p>
-            <a:endParaRPr lang="en-US"/>
+            <a:r>
+              <a:rPr lang="en-US" sz="2400" dirty="0"/>
+              <a:t>Team member, Cindy </a:t>
+            </a:r>
+            <a:r>
+              <a:rPr lang="en-US" sz="2400" dirty="0" err="1"/>
+              <a:t>Gorbas</a:t>
+            </a:r>
+            <a:r>
+              <a:rPr lang="en-US" sz="2400" dirty="0"/>
+              <a:t>, observed local real estate changes, particularly in East Orange County where she lives</a:t>
+            </a:r>
+          </a:p>
+          <a:p>
+            <a:r>
+              <a:rPr lang="en-US" sz="2400" dirty="0"/>
+              <a:t>Housing touches everyone and reflects economic and social changes in communities</a:t>
+            </a:r>
+          </a:p>
+          <a:p>
+            <a:r>
+              <a:rPr lang="en-US" sz="2400" dirty="0"/>
+              <a:t>We narrowed this focus to three factors of :</a:t>
+            </a:r>
+          </a:p>
+          <a:p>
+            <a:pPr marL="0" indent="0">
+              <a:buNone/>
+            </a:pPr>
+            <a:endParaRPr lang="en-US" dirty="0"/>
+          </a:p>
+          <a:p>
+            <a:endParaRPr lang="en-US" dirty="0"/>
+          </a:p>
+        </p:txBody>
+      </p:sp>
+      <p:sp>
+        <p:nvSpPr>
+          <p:cNvPr id="4" name="TextBox 3">
+            <a:extLst>
+              <a:ext uri="{FF2B5EF4-FFF2-40B4-BE49-F238E27FC236}">
+                <a16:creationId xmlns:a16="http://schemas.microsoft.com/office/drawing/2014/main" id="{51618444-5548-41BF-9DB5-1E2647110C93}"/>
+              </a:ext>
+            </a:extLst>
+          </p:cNvPr>
+          <p:cNvSpPr txBox="1"/>
+          <p:nvPr/>
+        </p:nvSpPr>
+        <p:spPr>
+          <a:xfrm>
+            <a:off x="1591597" y="4672614"/>
+            <a:ext cx="2138727" cy="523220"/>
+          </a:xfrm>
+          <a:prstGeom prst="rect">
+            <a:avLst/>
+          </a:prstGeom>
+          <a:noFill/>
+        </p:spPr>
+        <p:txBody>
+          <a:bodyPr wrap="none" rtlCol="0">
+            <a:spAutoFit/>
+          </a:bodyPr>
+          <a:lstStyle/>
+          <a:p>
+            <a:r>
+              <a:rPr lang="en-US" sz="2800" dirty="0"/>
+              <a:t>Availability</a:t>
+            </a:r>
+          </a:p>
+        </p:txBody>
+      </p:sp>
+      <p:sp>
+        <p:nvSpPr>
+          <p:cNvPr id="5" name="TextBox 4">
+            <a:extLst>
+              <a:ext uri="{FF2B5EF4-FFF2-40B4-BE49-F238E27FC236}">
+                <a16:creationId xmlns:a16="http://schemas.microsoft.com/office/drawing/2014/main" id="{6289F3AE-A3F4-4A3B-B7B6-8206D7A57873}"/>
+              </a:ext>
+            </a:extLst>
+          </p:cNvPr>
+          <p:cNvSpPr txBox="1"/>
+          <p:nvPr/>
+        </p:nvSpPr>
+        <p:spPr>
+          <a:xfrm>
+            <a:off x="4944082" y="4672614"/>
+            <a:ext cx="2303836" cy="523220"/>
+          </a:xfrm>
+          <a:prstGeom prst="rect">
+            <a:avLst/>
+          </a:prstGeom>
+          <a:noFill/>
+        </p:spPr>
+        <p:txBody>
+          <a:bodyPr wrap="none" rtlCol="0">
+            <a:spAutoFit/>
+          </a:bodyPr>
+          <a:lstStyle/>
+          <a:p>
+            <a:r>
+              <a:rPr lang="en-US" sz="2800" dirty="0"/>
+              <a:t>Affordability</a:t>
+            </a:r>
+          </a:p>
+        </p:txBody>
+      </p:sp>
+      <p:sp>
+        <p:nvSpPr>
+          <p:cNvPr id="6" name="TextBox 5">
+            <a:extLst>
+              <a:ext uri="{FF2B5EF4-FFF2-40B4-BE49-F238E27FC236}">
+                <a16:creationId xmlns:a16="http://schemas.microsoft.com/office/drawing/2014/main" id="{1C08E613-D313-48C9-8B68-6CE98B6D997A}"/>
+              </a:ext>
+            </a:extLst>
+          </p:cNvPr>
+          <p:cNvSpPr txBox="1"/>
+          <p:nvPr/>
+        </p:nvSpPr>
+        <p:spPr>
+          <a:xfrm>
+            <a:off x="8077200" y="4672614"/>
+            <a:ext cx="2558714" cy="523220"/>
+          </a:xfrm>
+          <a:prstGeom prst="rect">
+            <a:avLst/>
+          </a:prstGeom>
+          <a:noFill/>
+        </p:spPr>
+        <p:txBody>
+          <a:bodyPr wrap="none" rtlCol="0">
+            <a:spAutoFit/>
+          </a:bodyPr>
+          <a:lstStyle/>
+          <a:p>
+            <a:r>
+              <a:rPr lang="en-US" sz="2800" dirty="0"/>
+              <a:t>Demographics</a:t>
+            </a:r>
           </a:p>
         </p:txBody>
       </p:sp>
@@ -4448,6 +5503,176 @@
       </p:transition>
     </mc:Fallback>
   </mc:AlternateContent>
+  <p:timing>
+    <p:tnLst>
+      <p:par>
+        <p:cTn id="1" dur="indefinite" restart="never" nodeType="tmRoot">
+          <p:childTnLst>
+            <p:seq concurrent="1" nextAc="seek">
+              <p:cTn id="2" dur="indefinite" nodeType="mainSeq">
+                <p:childTnLst>
+                  <p:par>
+                    <p:cTn id="3" fill="hold">
+                      <p:stCondLst>
+                        <p:cond delay="indefinite"/>
+                      </p:stCondLst>
+                      <p:childTnLst>
+                        <p:par>
+                          <p:cTn id="4" fill="hold">
+                            <p:stCondLst>
+                              <p:cond delay="0"/>
+                            </p:stCondLst>
+                            <p:childTnLst>
+                              <p:par>
+                                <p:cTn id="5" presetID="1" presetClass="entr" presetSubtype="0" fill="hold" grpId="0" nodeType="clickEffect">
+                                  <p:stCondLst>
+                                    <p:cond delay="0"/>
+                                  </p:stCondLst>
+                                  <p:childTnLst>
+                                    <p:set>
+                                      <p:cBhvr>
+                                        <p:cTn id="6" dur="1" fill="hold">
+                                          <p:stCondLst>
+                                            <p:cond delay="0"/>
+                                          </p:stCondLst>
+                                        </p:cTn>
+                                        <p:tgtEl>
+                                          <p:spTgt spid="4"/>
+                                        </p:tgtEl>
+                                        <p:attrNameLst>
+                                          <p:attrName>style.visibility</p:attrName>
+                                        </p:attrNameLst>
+                                      </p:cBhvr>
+                                      <p:to>
+                                        <p:strVal val="visible"/>
+                                      </p:to>
+                                    </p:set>
+                                  </p:childTnLst>
+                                </p:cTn>
+                              </p:par>
+                            </p:childTnLst>
+                          </p:cTn>
+                        </p:par>
+                      </p:childTnLst>
+                    </p:cTn>
+                  </p:par>
+                  <p:par>
+                    <p:cTn id="7" fill="hold">
+                      <p:stCondLst>
+                        <p:cond delay="indefinite"/>
+                      </p:stCondLst>
+                      <p:childTnLst>
+                        <p:par>
+                          <p:cTn id="8" fill="hold">
+                            <p:stCondLst>
+                              <p:cond delay="0"/>
+                            </p:stCondLst>
+                            <p:childTnLst>
+                              <p:par>
+                                <p:cTn id="9" presetID="1" presetClass="entr" presetSubtype="0" fill="hold" grpId="0" nodeType="clickEffect">
+                                  <p:stCondLst>
+                                    <p:cond delay="0"/>
+                                  </p:stCondLst>
+                                  <p:childTnLst>
+                                    <p:set>
+                                      <p:cBhvr>
+                                        <p:cTn id="10" dur="1" fill="hold">
+                                          <p:stCondLst>
+                                            <p:cond delay="0"/>
+                                          </p:stCondLst>
+                                        </p:cTn>
+                                        <p:tgtEl>
+                                          <p:spTgt spid="5"/>
+                                        </p:tgtEl>
+                                        <p:attrNameLst>
+                                          <p:attrName>style.visibility</p:attrName>
+                                        </p:attrNameLst>
+                                      </p:cBhvr>
+                                      <p:to>
+                                        <p:strVal val="visible"/>
+                                      </p:to>
+                                    </p:set>
+                                  </p:childTnLst>
+                                </p:cTn>
+                              </p:par>
+                            </p:childTnLst>
+                          </p:cTn>
+                        </p:par>
+                      </p:childTnLst>
+                    </p:cTn>
+                  </p:par>
+                  <p:par>
+                    <p:cTn id="11" fill="hold">
+                      <p:stCondLst>
+                        <p:cond delay="indefinite"/>
+                      </p:stCondLst>
+                      <p:childTnLst>
+                        <p:par>
+                          <p:cTn id="12" fill="hold">
+                            <p:stCondLst>
+                              <p:cond delay="0"/>
+                            </p:stCondLst>
+                            <p:childTnLst>
+                              <p:par>
+                                <p:cTn id="13" presetID="1" presetClass="entr" presetSubtype="0" fill="hold" grpId="0" nodeType="clickEffect">
+                                  <p:stCondLst>
+                                    <p:cond delay="0"/>
+                                  </p:stCondLst>
+                                  <p:childTnLst>
+                                    <p:set>
+                                      <p:cBhvr>
+                                        <p:cTn id="14" dur="1" fill="hold">
+                                          <p:stCondLst>
+                                            <p:cond delay="0"/>
+                                          </p:stCondLst>
+                                        </p:cTn>
+                                        <p:tgtEl>
+                                          <p:spTgt spid="6"/>
+                                        </p:tgtEl>
+                                        <p:attrNameLst>
+                                          <p:attrName>style.visibility</p:attrName>
+                                        </p:attrNameLst>
+                                      </p:cBhvr>
+                                      <p:to>
+                                        <p:strVal val="visible"/>
+                                      </p:to>
+                                    </p:set>
+                                  </p:childTnLst>
+                                </p:cTn>
+                              </p:par>
+                            </p:childTnLst>
+                          </p:cTn>
+                        </p:par>
+                      </p:childTnLst>
+                    </p:cTn>
+                  </p:par>
+                </p:childTnLst>
+              </p:cTn>
+              <p:prevCondLst>
+                <p:cond evt="onPrev" delay="0">
+                  <p:tgtEl>
+                    <p:sldTgt/>
+                  </p:tgtEl>
+                </p:cond>
+              </p:prevCondLst>
+              <p:nextCondLst>
+                <p:cond evt="onNext" delay="0">
+                  <p:tgtEl>
+                    <p:sldTgt/>
+                  </p:tgtEl>
+                </p:cond>
+              </p:nextCondLst>
+            </p:seq>
+          </p:childTnLst>
+        </p:cTn>
+      </p:par>
+    </p:tnLst>
+    <p:bldLst>
+      <p:bldP spid="4" grpId="0"/>
+      <p:bldP spid="5" grpId="0"/>
+      <p:bldP spid="6" grpId="0"/>
+    </p:bldLst>
+  </p:timing>
 </p:sld>
 </file>
 
@@ -4470,87 +5695,259 @@
       </p:grpSpPr>
       <p:sp>
         <p:nvSpPr>
-          <p:cNvPr id="2" name="Title 1">
+          <p:cNvPr id="4" name="Content Placeholder 2">
             <a:extLst>
               <a:ext uri="{FF2B5EF4-FFF2-40B4-BE49-F238E27FC236}">
-                <a16:creationId xmlns:a16="http://schemas.microsoft.com/office/drawing/2014/main" id="{78FAE5D1-4645-4E07-BC33-F527A9C6C236}"/>
+                <a16:creationId xmlns:a16="http://schemas.microsoft.com/office/drawing/2014/main" id="{BF34E48B-CDFC-4B36-9EFF-3F0536CF806C}"/>
               </a:ext>
             </a:extLst>
           </p:cNvPr>
-          <p:cNvSpPr>
-            <a:spLocks noGrp="1"/>
-          </p:cNvSpPr>
-          <p:nvPr>
-            <p:ph type="title"/>
-          </p:nvPr>
-        </p:nvSpPr>
-        <p:spPr/>
-        <p:txBody>
-          <a:bodyPr/>
-          <a:lstStyle/>
-          <a:p>
-            <a:r>
-              <a:rPr lang="en-US" dirty="0"/>
-              <a:t>Question 1: Availability</a:t>
-            </a:r>
-          </a:p>
-        </p:txBody>
-      </p:sp>
-      <p:pic>
-        <p:nvPicPr>
-          <p:cNvPr id="6" name="Content Placeholder 5">
-            <a:extLst>
-              <a:ext uri="{FF2B5EF4-FFF2-40B4-BE49-F238E27FC236}">
-                <a16:creationId xmlns:a16="http://schemas.microsoft.com/office/drawing/2014/main" id="{19891CC7-EAF0-4DFC-8516-7CADD0FEA7B8}"/>
-              </a:ext>
-            </a:extLst>
-          </p:cNvPr>
-          <p:cNvPicPr>
-            <a:picLocks noGrp="1" noChangeAspect="1"/>
-          </p:cNvPicPr>
-          <p:nvPr>
-            <p:ph idx="1"/>
-          </p:nvPr>
-        </p:nvPicPr>
-        <p:blipFill>
-          <a:blip r:embed="rId2">
-            <a:extLst>
-              <a:ext uri="{28A0092B-C50C-407E-A947-70E740481C1C}">
-                <a14:useLocalDpi xmlns:a14="http://schemas.microsoft.com/office/drawing/2010/main" val="0"/>
-              </a:ext>
-            </a:extLst>
-          </a:blip>
-          <a:stretch>
-            <a:fillRect/>
-          </a:stretch>
-        </p:blipFill>
+          <p:cNvSpPr txBox="1">
+            <a:spLocks/>
+          </p:cNvSpPr>
+          <p:nvPr/>
+        </p:nvSpPr>
         <p:spPr>
           <a:xfrm>
-            <a:off x="541020" y="1371600"/>
-            <a:ext cx="7269482" cy="4038600"/>
+            <a:off x="838200" y="2474912"/>
+            <a:ext cx="10515600" cy="1908175"/>
           </a:xfrm>
+          <a:prstGeom prst="rect">
+            <a:avLst/>
+          </a:prstGeom>
         </p:spPr>
-      </p:pic>
-      <p:sp>
-        <p:nvSpPr>
-          <p:cNvPr id="5" name="Text Placeholder 4">
-            <a:extLst>
-              <a:ext uri="{FF2B5EF4-FFF2-40B4-BE49-F238E27FC236}">
-                <a16:creationId xmlns:a16="http://schemas.microsoft.com/office/drawing/2014/main" id="{05449ECE-C7BC-41D1-B712-1F0BCD3A7DE1}"/>
-              </a:ext>
-            </a:extLst>
-          </p:cNvPr>
-          <p:cNvSpPr>
-            <a:spLocks noGrp="1"/>
-          </p:cNvSpPr>
-          <p:nvPr>
-            <p:ph type="body" sz="half" idx="2"/>
-          </p:nvPr>
-        </p:nvSpPr>
-        <p:spPr/>
-        <p:txBody>
-          <a:bodyPr/>
-          <a:lstStyle/>
+        <p:txBody>
+          <a:bodyPr vert="horz" lIns="91440" tIns="45720" rIns="91440" bIns="45720" rtlCol="0">
+            <a:normAutofit fontScale="92500"/>
+          </a:bodyPr>
+          <a:lstStyle>
+            <a:lvl1pPr marL="228600" indent="-228600" algn="l" defTabSz="914400" rtl="0" eaLnBrk="1" latinLnBrk="0" hangingPunct="1">
+              <a:lnSpc>
+                <a:spcPct val="90000"/>
+              </a:lnSpc>
+              <a:spcBef>
+                <a:spcPts val="1800"/>
+              </a:spcBef>
+              <a:buClr>
+                <a:schemeClr val="accent1"/>
+              </a:buClr>
+              <a:buFont typeface="Arial" panose="020B0604020202020204" pitchFamily="34" charset="0"/>
+              <a:buChar char="•"/>
+              <a:defRPr sz="2000" kern="1200">
+                <a:solidFill>
+                  <a:schemeClr val="tx1"/>
+                </a:solidFill>
+                <a:latin typeface="+mn-lt"/>
+                <a:ea typeface="+mn-ea"/>
+                <a:cs typeface="+mn-cs"/>
+              </a:defRPr>
+            </a:lvl1pPr>
+            <a:lvl2pPr marL="457200" indent="-228600" algn="l" defTabSz="914400" rtl="0" eaLnBrk="1" latinLnBrk="0" hangingPunct="1">
+              <a:lnSpc>
+                <a:spcPct val="90000"/>
+              </a:lnSpc>
+              <a:spcBef>
+                <a:spcPts val="1000"/>
+              </a:spcBef>
+              <a:buClr>
+                <a:schemeClr val="accent1"/>
+              </a:buClr>
+              <a:buFont typeface="Arial" panose="020B0604020202020204" pitchFamily="34" charset="0"/>
+              <a:buChar char="•"/>
+              <a:defRPr sz="1800" kern="1200">
+                <a:solidFill>
+                  <a:schemeClr val="tx1"/>
+                </a:solidFill>
+                <a:latin typeface="+mn-lt"/>
+                <a:ea typeface="+mn-ea"/>
+                <a:cs typeface="+mn-cs"/>
+              </a:defRPr>
+            </a:lvl2pPr>
+            <a:lvl3pPr marL="685800" indent="-182880" algn="l" defTabSz="914400" rtl="0" eaLnBrk="1" latinLnBrk="0" hangingPunct="1">
+              <a:lnSpc>
+                <a:spcPct val="90000"/>
+              </a:lnSpc>
+              <a:spcBef>
+                <a:spcPts val="800"/>
+              </a:spcBef>
+              <a:buClr>
+                <a:schemeClr val="accent1"/>
+              </a:buClr>
+              <a:buFont typeface="Arial" panose="020B0604020202020204" pitchFamily="34" charset="0"/>
+              <a:buChar char="•"/>
+              <a:defRPr sz="1600" kern="1200">
+                <a:solidFill>
+                  <a:schemeClr val="tx1"/>
+                </a:solidFill>
+                <a:latin typeface="+mn-lt"/>
+                <a:ea typeface="+mn-ea"/>
+                <a:cs typeface="+mn-cs"/>
+              </a:defRPr>
+            </a:lvl3pPr>
+            <a:lvl4pPr marL="914400" indent="-182880" algn="l" defTabSz="914400" rtl="0" eaLnBrk="1" latinLnBrk="0" hangingPunct="1">
+              <a:lnSpc>
+                <a:spcPct val="90000"/>
+              </a:lnSpc>
+              <a:spcBef>
+                <a:spcPts val="800"/>
+              </a:spcBef>
+              <a:buClr>
+                <a:schemeClr val="accent1"/>
+              </a:buClr>
+              <a:buFont typeface="Arial" panose="020B0604020202020204" pitchFamily="34" charset="0"/>
+              <a:buChar char="•"/>
+              <a:defRPr sz="1400" kern="1200">
+                <a:solidFill>
+                  <a:schemeClr val="tx1"/>
+                </a:solidFill>
+                <a:latin typeface="+mn-lt"/>
+                <a:ea typeface="+mn-ea"/>
+                <a:cs typeface="+mn-cs"/>
+              </a:defRPr>
+            </a:lvl4pPr>
+            <a:lvl5pPr marL="1143000" indent="-182880" algn="l" defTabSz="914400" rtl="0" eaLnBrk="1" latinLnBrk="0" hangingPunct="1">
+              <a:lnSpc>
+                <a:spcPct val="90000"/>
+              </a:lnSpc>
+              <a:spcBef>
+                <a:spcPts val="800"/>
+              </a:spcBef>
+              <a:buClr>
+                <a:schemeClr val="accent1"/>
+              </a:buClr>
+              <a:buFont typeface="Arial" panose="020B0604020202020204" pitchFamily="34" charset="0"/>
+              <a:buChar char="•"/>
+              <a:defRPr sz="1400" kern="1200">
+                <a:solidFill>
+                  <a:schemeClr val="tx1"/>
+                </a:solidFill>
+                <a:latin typeface="+mn-lt"/>
+                <a:ea typeface="+mn-ea"/>
+                <a:cs typeface="+mn-cs"/>
+              </a:defRPr>
+            </a:lvl5pPr>
+            <a:lvl6pPr marL="1371600" indent="-182880" algn="l" defTabSz="914400" rtl="0" eaLnBrk="1" latinLnBrk="0" hangingPunct="1">
+              <a:lnSpc>
+                <a:spcPct val="90000"/>
+              </a:lnSpc>
+              <a:spcBef>
+                <a:spcPts val="800"/>
+              </a:spcBef>
+              <a:buClr>
+                <a:schemeClr val="accent1"/>
+              </a:buClr>
+              <a:buFont typeface="Arial" panose="020B0604020202020204" pitchFamily="34" charset="0"/>
+              <a:buChar char="•"/>
+              <a:defRPr sz="1400" kern="1200">
+                <a:solidFill>
+                  <a:schemeClr val="tx1"/>
+                </a:solidFill>
+                <a:latin typeface="+mn-lt"/>
+                <a:ea typeface="+mn-ea"/>
+                <a:cs typeface="+mn-cs"/>
+              </a:defRPr>
+            </a:lvl6pPr>
+            <a:lvl7pPr marL="1600200" indent="-182880" algn="l" defTabSz="914400" rtl="0" eaLnBrk="1" latinLnBrk="0" hangingPunct="1">
+              <a:lnSpc>
+                <a:spcPct val="90000"/>
+              </a:lnSpc>
+              <a:spcBef>
+                <a:spcPts val="800"/>
+              </a:spcBef>
+              <a:buClr>
+                <a:schemeClr val="accent1"/>
+              </a:buClr>
+              <a:buFont typeface="Arial" panose="020B0604020202020204" pitchFamily="34" charset="0"/>
+              <a:buChar char="•"/>
+              <a:defRPr sz="1400" kern="1200">
+                <a:solidFill>
+                  <a:schemeClr val="tx1"/>
+                </a:solidFill>
+                <a:latin typeface="+mn-lt"/>
+                <a:ea typeface="+mn-ea"/>
+                <a:cs typeface="+mn-cs"/>
+              </a:defRPr>
+            </a:lvl7pPr>
+            <a:lvl8pPr marL="1828800" indent="-182880" algn="l" defTabSz="914400" rtl="0" eaLnBrk="1" latinLnBrk="0" hangingPunct="1">
+              <a:lnSpc>
+                <a:spcPct val="90000"/>
+              </a:lnSpc>
+              <a:spcBef>
+                <a:spcPts val="800"/>
+              </a:spcBef>
+              <a:buClr>
+                <a:schemeClr val="accent1"/>
+              </a:buClr>
+              <a:buFont typeface="Arial" panose="020B0604020202020204" pitchFamily="34" charset="0"/>
+              <a:buChar char="•"/>
+              <a:defRPr sz="1400" kern="1200">
+                <a:solidFill>
+                  <a:schemeClr val="tx1"/>
+                </a:solidFill>
+                <a:latin typeface="+mn-lt"/>
+                <a:ea typeface="+mn-ea"/>
+                <a:cs typeface="+mn-cs"/>
+              </a:defRPr>
+            </a:lvl8pPr>
+            <a:lvl9pPr marL="2057400" indent="-182880" algn="l" defTabSz="914400" rtl="0" eaLnBrk="1" latinLnBrk="0" hangingPunct="1">
+              <a:lnSpc>
+                <a:spcPct val="90000"/>
+              </a:lnSpc>
+              <a:spcBef>
+                <a:spcPts val="800"/>
+              </a:spcBef>
+              <a:buClr>
+                <a:schemeClr val="accent1"/>
+              </a:buClr>
+              <a:buFont typeface="Arial" panose="020B0604020202020204" pitchFamily="34" charset="0"/>
+              <a:buChar char="•"/>
+              <a:defRPr sz="1400" kern="1200">
+                <a:solidFill>
+                  <a:schemeClr val="tx1"/>
+                </a:solidFill>
+                <a:latin typeface="+mn-lt"/>
+                <a:ea typeface="+mn-ea"/>
+                <a:cs typeface="+mn-cs"/>
+              </a:defRPr>
+            </a:lvl9pPr>
+          </a:lstStyle>
+          <a:p>
+            <a:endParaRPr lang="en-US" dirty="0"/>
+          </a:p>
+          <a:p>
+            <a:pPr marL="0" indent="0" algn="ctr">
+              <a:buNone/>
+            </a:pPr>
+            <a:r>
+              <a:rPr lang="en-US" sz="2800" dirty="0"/>
+              <a:t> </a:t>
+            </a:r>
+            <a:r>
+              <a:rPr lang="en-US" sz="3500" dirty="0">
+                <a:solidFill>
+                  <a:schemeClr val="tx2">
+                    <a:lumMod val="75000"/>
+                  </a:schemeClr>
+                </a:solidFill>
+              </a:rPr>
+              <a:t>As housing volume increases,</a:t>
+            </a:r>
+          </a:p>
+          <a:p>
+            <a:pPr marL="0" indent="0" algn="ctr">
+              <a:buNone/>
+            </a:pPr>
+            <a:r>
+              <a:rPr lang="en-US" sz="3500" dirty="0">
+                <a:solidFill>
+                  <a:schemeClr val="tx2">
+                    <a:lumMod val="75000"/>
+                  </a:schemeClr>
+                </a:solidFill>
+              </a:rPr>
+              <a:t> is home ownership becoming a less attainable goal? </a:t>
+            </a:r>
+          </a:p>
           <a:p>
             <a:endParaRPr lang="en-US" dirty="0"/>
           </a:p>
@@ -4559,7 +5956,7 @@
     </p:spTree>
     <p:extLst>
       <p:ext uri="{BB962C8B-B14F-4D97-AF65-F5344CB8AC3E}">
-        <p14:creationId xmlns:p14="http://schemas.microsoft.com/office/powerpoint/2010/main" val="1987509164"/>
+        <p14:creationId xmlns:p14="http://schemas.microsoft.com/office/powerpoint/2010/main" val="1991090515"/>
       </p:ext>
     </p:extLst>
   </p:cSld>
@@ -4603,6 +6000,139 @@
           <p:cNvPr id="2" name="Title 1">
             <a:extLst>
               <a:ext uri="{FF2B5EF4-FFF2-40B4-BE49-F238E27FC236}">
+                <a16:creationId xmlns:a16="http://schemas.microsoft.com/office/drawing/2014/main" id="{78FAE5D1-4645-4E07-BC33-F527A9C6C236}"/>
+              </a:ext>
+            </a:extLst>
+          </p:cNvPr>
+          <p:cNvSpPr>
+            <a:spLocks noGrp="1"/>
+          </p:cNvSpPr>
+          <p:nvPr>
+            <p:ph type="title"/>
+          </p:nvPr>
+        </p:nvSpPr>
+        <p:spPr/>
+        <p:txBody>
+          <a:bodyPr/>
+          <a:lstStyle/>
+          <a:p>
+            <a:r>
+              <a:rPr lang="en-US" dirty="0"/>
+              <a:t>Question 1: Availability</a:t>
+            </a:r>
+          </a:p>
+        </p:txBody>
+      </p:sp>
+      <p:pic>
+        <p:nvPicPr>
+          <p:cNvPr id="6" name="Content Placeholder 5">
+            <a:extLst>
+              <a:ext uri="{FF2B5EF4-FFF2-40B4-BE49-F238E27FC236}">
+                <a16:creationId xmlns:a16="http://schemas.microsoft.com/office/drawing/2014/main" id="{19891CC7-EAF0-4DFC-8516-7CADD0FEA7B8}"/>
+              </a:ext>
+            </a:extLst>
+          </p:cNvPr>
+          <p:cNvPicPr>
+            <a:picLocks noGrp="1" noChangeAspect="1"/>
+          </p:cNvPicPr>
+          <p:nvPr>
+            <p:ph idx="1"/>
+          </p:nvPr>
+        </p:nvPicPr>
+        <p:blipFill>
+          <a:blip r:embed="rId2">
+            <a:extLst>
+              <a:ext uri="{28A0092B-C50C-407E-A947-70E740481C1C}">
+                <a14:useLocalDpi xmlns:a14="http://schemas.microsoft.com/office/drawing/2010/main" val="0"/>
+              </a:ext>
+            </a:extLst>
+          </a:blip>
+          <a:stretch>
+            <a:fillRect/>
+          </a:stretch>
+        </p:blipFill>
+        <p:spPr>
+          <a:xfrm>
+            <a:off x="541020" y="1371600"/>
+            <a:ext cx="7269482" cy="4038600"/>
+          </a:xfrm>
+        </p:spPr>
+      </p:pic>
+      <p:sp>
+        <p:nvSpPr>
+          <p:cNvPr id="5" name="Text Placeholder 4">
+            <a:extLst>
+              <a:ext uri="{FF2B5EF4-FFF2-40B4-BE49-F238E27FC236}">
+                <a16:creationId xmlns:a16="http://schemas.microsoft.com/office/drawing/2014/main" id="{05449ECE-C7BC-41D1-B712-1F0BCD3A7DE1}"/>
+              </a:ext>
+            </a:extLst>
+          </p:cNvPr>
+          <p:cNvSpPr>
+            <a:spLocks noGrp="1"/>
+          </p:cNvSpPr>
+          <p:nvPr>
+            <p:ph type="body" sz="half" idx="2"/>
+          </p:nvPr>
+        </p:nvSpPr>
+        <p:spPr/>
+        <p:txBody>
+          <a:bodyPr/>
+          <a:lstStyle/>
+          <a:p>
+            <a:r>
+              <a:rPr lang="en-US" dirty="0"/>
+              <a:t>Available Housing</a:t>
+            </a:r>
+          </a:p>
+        </p:txBody>
+      </p:sp>
+    </p:spTree>
+    <p:extLst>
+      <p:ext uri="{BB962C8B-B14F-4D97-AF65-F5344CB8AC3E}">
+        <p14:creationId xmlns:p14="http://schemas.microsoft.com/office/powerpoint/2010/main" val="1987509164"/>
+      </p:ext>
+    </p:extLst>
+  </p:cSld>
+  <p:clrMapOvr>
+    <a:masterClrMapping/>
+  </p:clrMapOvr>
+  <mc:AlternateContent xmlns:mc="http://schemas.openxmlformats.org/markup-compatibility/2006" xmlns:p14="http://schemas.microsoft.com/office/powerpoint/2010/main">
+    <mc:Choice Requires="p14">
+      <p:transition spd="med" p14:dur="700">
+        <p:fade/>
+      </p:transition>
+    </mc:Choice>
+    <mc:Fallback xmlns="">
+      <p:transition spd="med">
+        <p:fade/>
+      </p:transition>
+    </mc:Fallback>
+  </mc:AlternateContent>
+</p:sld>
+</file>
+
+<file path=ppt/slides/slide5.xml><?xml version="1.0" encoding="utf-8"?>
+<p:sld xmlns:a="http://schemas.openxmlformats.org/drawingml/2006/main" xmlns:r="http://schemas.openxmlformats.org/officeDocument/2006/relationships" xmlns:p="http://schemas.openxmlformats.org/presentationml/2006/main">
+  <p:cSld>
+    <p:spTree>
+      <p:nvGrpSpPr>
+        <p:cNvPr id="1" name=""/>
+        <p:cNvGrpSpPr/>
+        <p:nvPr/>
+      </p:nvGrpSpPr>
+      <p:grpSpPr>
+        <a:xfrm>
+          <a:off x="0" y="0"/>
+          <a:ext cx="0" cy="0"/>
+          <a:chOff x="0" y="0"/>
+          <a:chExt cx="0" cy="0"/>
+        </a:xfrm>
+      </p:grpSpPr>
+      <p:sp>
+        <p:nvSpPr>
+          <p:cNvPr id="2" name="Title 1">
+            <a:extLst>
+              <a:ext uri="{FF2B5EF4-FFF2-40B4-BE49-F238E27FC236}">
                 <a16:creationId xmlns:a16="http://schemas.microsoft.com/office/drawing/2014/main" id="{AAF78278-52B7-4CCC-AD8E-7D873CE2AF84}"/>
               </a:ext>
             </a:extLst>
@@ -4657,7 +6187,7 @@
         <p:spPr>
           <a:xfrm>
             <a:off x="609601" y="213338"/>
-            <a:ext cx="7298480" cy="3097675"/>
+            <a:ext cx="7315198" cy="3097675"/>
           </a:xfrm>
         </p:spPr>
       </p:pic>
@@ -4682,7 +6212,10 @@
           <a:bodyPr/>
           <a:lstStyle/>
           <a:p>
-            <a:endParaRPr lang="en-US"/>
+            <a:r>
+              <a:rPr lang="en-US" dirty="0"/>
+              <a:t>Income vs Housing Prices</a:t>
+            </a:r>
           </a:p>
         </p:txBody>
       </p:sp>
@@ -4747,7 +6280,7 @@
 </p:sld>
 </file>
 
-<file path=ppt/slides/slide5.xml><?xml version="1.0" encoding="utf-8"?>
+<file path=ppt/slides/slide6.xml><?xml version="1.0" encoding="utf-8"?>
 <p:sld xmlns:a="http://schemas.openxmlformats.org/drawingml/2006/main" xmlns:r="http://schemas.openxmlformats.org/officeDocument/2006/relationships" xmlns:p="http://schemas.openxmlformats.org/presentationml/2006/main">
   <p:cSld>
     <p:spTree>
@@ -4843,7 +6376,12 @@
             <p:ph type="body" sz="half" idx="2"/>
           </p:nvPr>
         </p:nvSpPr>
-        <p:spPr/>
+        <p:spPr>
+          <a:xfrm>
+            <a:off x="7924800" y="3581400"/>
+            <a:ext cx="3429000" cy="1828800"/>
+          </a:xfrm>
+        </p:spPr>
         <p:txBody>
           <a:bodyPr/>
           <a:lstStyle/>
@@ -4859,139 +6397,6 @@
     <p:extLst>
       <p:ext uri="{BB962C8B-B14F-4D97-AF65-F5344CB8AC3E}">
         <p14:creationId xmlns:p14="http://schemas.microsoft.com/office/powerpoint/2010/main" val="2453513752"/>
-      </p:ext>
-    </p:extLst>
-  </p:cSld>
-  <p:clrMapOvr>
-    <a:masterClrMapping/>
-  </p:clrMapOvr>
-  <mc:AlternateContent xmlns:mc="http://schemas.openxmlformats.org/markup-compatibility/2006" xmlns:p14="http://schemas.microsoft.com/office/powerpoint/2010/main">
-    <mc:Choice Requires="p14">
-      <p:transition spd="med" p14:dur="700">
-        <p:fade/>
-      </p:transition>
-    </mc:Choice>
-    <mc:Fallback xmlns="">
-      <p:transition spd="med">
-        <p:fade/>
-      </p:transition>
-    </mc:Fallback>
-  </mc:AlternateContent>
-</p:sld>
-</file>
-
-<file path=ppt/slides/slide6.xml><?xml version="1.0" encoding="utf-8"?>
-<p:sld xmlns:a="http://schemas.openxmlformats.org/drawingml/2006/main" xmlns:r="http://schemas.openxmlformats.org/officeDocument/2006/relationships" xmlns:p="http://schemas.openxmlformats.org/presentationml/2006/main">
-  <p:cSld>
-    <p:spTree>
-      <p:nvGrpSpPr>
-        <p:cNvPr id="1" name=""/>
-        <p:cNvGrpSpPr/>
-        <p:nvPr/>
-      </p:nvGrpSpPr>
-      <p:grpSpPr>
-        <a:xfrm>
-          <a:off x="0" y="0"/>
-          <a:ext cx="0" cy="0"/>
-          <a:chOff x="0" y="0"/>
-          <a:chExt cx="0" cy="0"/>
-        </a:xfrm>
-      </p:grpSpPr>
-      <p:sp>
-        <p:nvSpPr>
-          <p:cNvPr id="2" name="Title 1">
-            <a:extLst>
-              <a:ext uri="{FF2B5EF4-FFF2-40B4-BE49-F238E27FC236}">
-                <a16:creationId xmlns:a16="http://schemas.microsoft.com/office/drawing/2014/main" id="{81DB3431-6291-4D88-96BE-B787DF56C10A}"/>
-              </a:ext>
-            </a:extLst>
-          </p:cNvPr>
-          <p:cNvSpPr>
-            <a:spLocks noGrp="1"/>
-          </p:cNvSpPr>
-          <p:nvPr>
-            <p:ph type="title"/>
-          </p:nvPr>
-        </p:nvSpPr>
-        <p:spPr/>
-        <p:txBody>
-          <a:bodyPr/>
-          <a:lstStyle/>
-          <a:p>
-            <a:r>
-              <a:rPr lang="en-US" dirty="0"/>
-              <a:t>Question 3: Demographic Changes</a:t>
-            </a:r>
-          </a:p>
-        </p:txBody>
-      </p:sp>
-      <p:pic>
-        <p:nvPicPr>
-          <p:cNvPr id="6" name="Content Placeholder 5">
-            <a:extLst>
-              <a:ext uri="{FF2B5EF4-FFF2-40B4-BE49-F238E27FC236}">
-                <a16:creationId xmlns:a16="http://schemas.microsoft.com/office/drawing/2014/main" id="{9D1D8E82-670D-4AE0-A790-AF9D52FBA889}"/>
-              </a:ext>
-            </a:extLst>
-          </p:cNvPr>
-          <p:cNvPicPr>
-            <a:picLocks noGrp="1" noChangeAspect="1"/>
-          </p:cNvPicPr>
-          <p:nvPr>
-            <p:ph idx="1"/>
-          </p:nvPr>
-        </p:nvPicPr>
-        <p:blipFill>
-          <a:blip r:embed="rId2">
-            <a:extLst>
-              <a:ext uri="{28A0092B-C50C-407E-A947-70E740481C1C}">
-                <a14:useLocalDpi xmlns:a14="http://schemas.microsoft.com/office/drawing/2010/main" val="0"/>
-              </a:ext>
-            </a:extLst>
-          </a:blip>
-          <a:stretch>
-            <a:fillRect/>
-          </a:stretch>
-        </p:blipFill>
-        <p:spPr>
-          <a:xfrm>
-            <a:off x="257244" y="1219200"/>
-            <a:ext cx="7667556" cy="3465985"/>
-          </a:xfrm>
-        </p:spPr>
-      </p:pic>
-      <p:sp>
-        <p:nvSpPr>
-          <p:cNvPr id="4" name="Text Placeholder 3">
-            <a:extLst>
-              <a:ext uri="{FF2B5EF4-FFF2-40B4-BE49-F238E27FC236}">
-                <a16:creationId xmlns:a16="http://schemas.microsoft.com/office/drawing/2014/main" id="{DCC92131-E9C0-4708-9063-2F8C8F124067}"/>
-              </a:ext>
-            </a:extLst>
-          </p:cNvPr>
-          <p:cNvSpPr>
-            <a:spLocks noGrp="1"/>
-          </p:cNvSpPr>
-          <p:nvPr>
-            <p:ph type="body" sz="half" idx="2"/>
-          </p:nvPr>
-        </p:nvSpPr>
-        <p:spPr/>
-        <p:txBody>
-          <a:bodyPr/>
-          <a:lstStyle/>
-          <a:p>
-            <a:r>
-              <a:rPr lang="en-US" dirty="0"/>
-              <a:t>Race</a:t>
-            </a:r>
-          </a:p>
-        </p:txBody>
-      </p:sp>
-    </p:spTree>
-    <p:extLst>
-      <p:ext uri="{BB962C8B-B14F-4D97-AF65-F5344CB8AC3E}">
-        <p14:creationId xmlns:p14="http://schemas.microsoft.com/office/powerpoint/2010/main" val="707463969"/>
       </p:ext>
     </p:extLst>
   </p:cSld>
@@ -5063,7 +6468,7 @@
           <p:cNvPr id="6" name="Content Placeholder 5">
             <a:extLst>
               <a:ext uri="{FF2B5EF4-FFF2-40B4-BE49-F238E27FC236}">
-                <a16:creationId xmlns:a16="http://schemas.microsoft.com/office/drawing/2014/main" id="{E20BB6C7-54AE-4F0B-B0DD-9BB776946DBF}"/>
+                <a16:creationId xmlns:a16="http://schemas.microsoft.com/office/drawing/2014/main" id="{9D1D8E82-670D-4AE0-A790-AF9D52FBA889}"/>
               </a:ext>
             </a:extLst>
           </p:cNvPr>
@@ -5088,8 +6493,8 @@
         </p:blipFill>
         <p:spPr>
           <a:xfrm>
-            <a:off x="304800" y="1219200"/>
-            <a:ext cx="7555892" cy="3635265"/>
+            <a:off x="190811" y="1289482"/>
+            <a:ext cx="7667556" cy="3465985"/>
           </a:xfrm>
         </p:spPr>
       </p:pic>
@@ -5116,7 +6521,7 @@
           <a:p>
             <a:r>
               <a:rPr lang="en-US" dirty="0"/>
-              <a:t>Age Range</a:t>
+              <a:t>Race</a:t>
             </a:r>
           </a:p>
         </p:txBody>
@@ -5124,7 +6529,7 @@
     </p:spTree>
     <p:extLst>
       <p:ext uri="{BB962C8B-B14F-4D97-AF65-F5344CB8AC3E}">
-        <p14:creationId xmlns:p14="http://schemas.microsoft.com/office/powerpoint/2010/main" val="1181949973"/>
+        <p14:creationId xmlns:p14="http://schemas.microsoft.com/office/powerpoint/2010/main" val="707463969"/>
       </p:ext>
     </p:extLst>
   </p:cSld>
@@ -5165,10 +6570,10 @@
       </p:grpSpPr>
       <p:sp>
         <p:nvSpPr>
-          <p:cNvPr id="5" name="Title 4">
+          <p:cNvPr id="2" name="Title 1">
             <a:extLst>
               <a:ext uri="{FF2B5EF4-FFF2-40B4-BE49-F238E27FC236}">
-                <a16:creationId xmlns:a16="http://schemas.microsoft.com/office/drawing/2014/main" id="{60928B2D-6D8A-4A34-B883-8AF2366CA4ED}"/>
+                <a16:creationId xmlns:a16="http://schemas.microsoft.com/office/drawing/2014/main" id="{81DB3431-6291-4D88-96BE-B787DF56C10A}"/>
               </a:ext>
             </a:extLst>
           </p:cNvPr>
@@ -5186,25 +6591,60 @@
           <a:p>
             <a:r>
               <a:rPr lang="en-US" dirty="0"/>
-              <a:t>Data Cleanup &amp; Exploration</a:t>
-            </a:r>
-          </a:p>
-        </p:txBody>
-      </p:sp>
-      <p:sp>
-        <p:nvSpPr>
+              <a:t>Question 3: Demographic Changes</a:t>
+            </a:r>
+          </a:p>
+        </p:txBody>
+      </p:sp>
+      <p:pic>
+        <p:nvPicPr>
           <p:cNvPr id="6" name="Content Placeholder 5">
             <a:extLst>
               <a:ext uri="{FF2B5EF4-FFF2-40B4-BE49-F238E27FC236}">
-                <a16:creationId xmlns:a16="http://schemas.microsoft.com/office/drawing/2014/main" id="{AEAF33BA-40C5-4D07-85EA-272E84F4C590}"/>
+                <a16:creationId xmlns:a16="http://schemas.microsoft.com/office/drawing/2014/main" id="{E20BB6C7-54AE-4F0B-B0DD-9BB776946DBF}"/>
               </a:ext>
             </a:extLst>
           </p:cNvPr>
-          <p:cNvSpPr>
-            <a:spLocks noGrp="1"/>
-          </p:cNvSpPr>
+          <p:cNvPicPr>
+            <a:picLocks noGrp="1" noChangeAspect="1"/>
+          </p:cNvPicPr>
           <p:nvPr>
             <p:ph idx="1"/>
+          </p:nvPr>
+        </p:nvPicPr>
+        <p:blipFill>
+          <a:blip r:embed="rId2">
+            <a:extLst>
+              <a:ext uri="{28A0092B-C50C-407E-A947-70E740481C1C}">
+                <a14:useLocalDpi xmlns:a14="http://schemas.microsoft.com/office/drawing/2010/main" val="0"/>
+              </a:ext>
+            </a:extLst>
+          </a:blip>
+          <a:stretch>
+            <a:fillRect/>
+          </a:stretch>
+        </p:blipFill>
+        <p:spPr>
+          <a:xfrm>
+            <a:off x="304800" y="1219200"/>
+            <a:ext cx="7555892" cy="3635265"/>
+          </a:xfrm>
+        </p:spPr>
+      </p:pic>
+      <p:sp>
+        <p:nvSpPr>
+          <p:cNvPr id="4" name="Text Placeholder 3">
+            <a:extLst>
+              <a:ext uri="{FF2B5EF4-FFF2-40B4-BE49-F238E27FC236}">
+                <a16:creationId xmlns:a16="http://schemas.microsoft.com/office/drawing/2014/main" id="{DCC92131-E9C0-4708-9063-2F8C8F124067}"/>
+              </a:ext>
+            </a:extLst>
+          </p:cNvPr>
+          <p:cNvSpPr>
+            <a:spLocks noGrp="1"/>
+          </p:cNvSpPr>
+          <p:nvPr>
+            <p:ph type="body" sz="half" idx="2"/>
           </p:nvPr>
         </p:nvSpPr>
         <p:spPr/>
@@ -5214,31 +6654,7 @@
           <a:p>
             <a:r>
               <a:rPr lang="en-US" dirty="0"/>
-              <a:t>Methods of data collection including .csv pulls from the Multiple Listing Service (MLS) database and API pulls from the US government’s American Community Survey census.</a:t>
-            </a:r>
-          </a:p>
-          <a:p>
-            <a:pPr marL="0" indent="0">
-              <a:buNone/>
-            </a:pPr>
-            <a:endParaRPr lang="en-US" dirty="0"/>
-          </a:p>
-          <a:p>
-            <a:r>
-              <a:rPr lang="en-US" dirty="0"/>
-              <a:t>Data clean up involved limiting year ranges based on overlap between two datasets, as well as targeting what was relevant and targeted in mass of data.</a:t>
-            </a:r>
-          </a:p>
-          <a:p>
-            <a:pPr marL="0" indent="0">
-              <a:buNone/>
-            </a:pPr>
-            <a:endParaRPr lang="en-US" dirty="0"/>
-          </a:p>
-          <a:p>
-            <a:r>
-              <a:rPr lang="en-US" dirty="0"/>
-              <a:t>Surprising elements were the consistencies in demographics over time (though admittedly our year range is limited) and the discrepancy between family and non-family incomes.</a:t>
+              <a:t>Age Groups</a:t>
             </a:r>
           </a:p>
         </p:txBody>
@@ -5246,7 +6662,7 @@
     </p:spTree>
     <p:extLst>
       <p:ext uri="{BB962C8B-B14F-4D97-AF65-F5344CB8AC3E}">
-        <p14:creationId xmlns:p14="http://schemas.microsoft.com/office/powerpoint/2010/main" val="3589475554"/>
+        <p14:creationId xmlns:p14="http://schemas.microsoft.com/office/powerpoint/2010/main" val="1181949973"/>
       </p:ext>
     </p:extLst>
   </p:cSld>
@@ -5287,10 +6703,10 @@
       </p:grpSpPr>
       <p:sp>
         <p:nvSpPr>
-          <p:cNvPr id="2" name="Title 1">
+          <p:cNvPr id="5" name="Title 4">
             <a:extLst>
               <a:ext uri="{FF2B5EF4-FFF2-40B4-BE49-F238E27FC236}">
-                <a16:creationId xmlns:a16="http://schemas.microsoft.com/office/drawing/2014/main" id="{4A976F62-38FC-4B90-8209-4C25001787FC}"/>
+                <a16:creationId xmlns:a16="http://schemas.microsoft.com/office/drawing/2014/main" id="{60928B2D-6D8A-4A34-B883-8AF2366CA4ED}"/>
               </a:ext>
             </a:extLst>
           </p:cNvPr>
@@ -5308,17 +6724,17 @@
           <a:p>
             <a:r>
               <a:rPr lang="en-US" dirty="0"/>
-              <a:t>Post Mortem</a:t>
-            </a:r>
-          </a:p>
-        </p:txBody>
-      </p:sp>
-      <p:sp>
-        <p:nvSpPr>
-          <p:cNvPr id="3" name="Content Placeholder 2">
+              <a:t>Data Cleanup &amp; Exploration</a:t>
+            </a:r>
+          </a:p>
+        </p:txBody>
+      </p:sp>
+      <p:sp>
+        <p:nvSpPr>
+          <p:cNvPr id="6" name="Content Placeholder 5">
             <a:extLst>
               <a:ext uri="{FF2B5EF4-FFF2-40B4-BE49-F238E27FC236}">
-                <a16:creationId xmlns:a16="http://schemas.microsoft.com/office/drawing/2014/main" id="{2730CC84-5563-4FF8-9ABA-99712EB5C434}"/>
+                <a16:creationId xmlns:a16="http://schemas.microsoft.com/office/drawing/2014/main" id="{AEAF33BA-40C5-4D07-85EA-272E84F4C590}"/>
               </a:ext>
             </a:extLst>
           </p:cNvPr>
@@ -5336,19 +6752,31 @@
           <a:p>
             <a:r>
               <a:rPr lang="en-US" dirty="0"/>
-              <a:t>Discuss any difficulties that arose, and how you dealt with them</a:t>
-            </a:r>
+              <a:t>Methods of data collection including .csv pulls from the Multiple Listing Service (MLS) database and API pulls from the US government’s American Community Survey census.</a:t>
+            </a:r>
+          </a:p>
+          <a:p>
+            <a:pPr marL="0" indent="0">
+              <a:buNone/>
+            </a:pPr>
+            <a:endParaRPr lang="en-US" dirty="0"/>
           </a:p>
           <a:p>
             <a:r>
               <a:rPr lang="en-US" dirty="0"/>
-              <a:t>Discuss any additional questions that came up, but which you didn't have time to answer: What would you research next, if you had two more weeks?</a:t>
-            </a:r>
+              <a:t>Data clean up involved limiting year ranges based on overlap between two datasets, as well as targeting what was relevant and targeted in mass of data.</a:t>
+            </a:r>
+          </a:p>
+          <a:p>
+            <a:pPr marL="0" indent="0">
+              <a:buNone/>
+            </a:pPr>
+            <a:endParaRPr lang="en-US" dirty="0"/>
           </a:p>
           <a:p>
             <a:r>
               <a:rPr lang="en-US" dirty="0"/>
-              <a:t>Basically acknowledge limitations</a:t>
+              <a:t>Surprising elements were the consistencies in demographics over time (though admittedly our year range is limited) and the discrepancy between family and non-family incomes.</a:t>
             </a:r>
           </a:p>
         </p:txBody>
@@ -5356,7 +6784,7 @@
     </p:spTree>
     <p:extLst>
       <p:ext uri="{BB962C8B-B14F-4D97-AF65-F5344CB8AC3E}">
-        <p14:creationId xmlns:p14="http://schemas.microsoft.com/office/powerpoint/2010/main" val="1690957519"/>
+        <p14:creationId xmlns:p14="http://schemas.microsoft.com/office/powerpoint/2010/main" val="3589475554"/>
       </p:ext>
     </p:extLst>
   </p:cSld>

</xml_diff>

<commit_message>
Modified after presentation to account for labeling errors in graph generation.
</commit_message>
<xml_diff>
--- a/Housing in Orange County, FL.pptx
+++ b/Housing in Orange County, FL.pptx
@@ -135,7 +135,7 @@
 <file path=ppt/revisionInfo.xml><?xml version="1.0" encoding="utf-8"?>
 <p1510:revInfo xmlns:a="http://schemas.openxmlformats.org/drawingml/2006/main" xmlns:r="http://schemas.openxmlformats.org/officeDocument/2006/relationships" xmlns:p1510="http://schemas.microsoft.com/office/powerpoint/2015/10/main">
   <p1510:revLst>
-    <p1510:client id="{88168AFA-D758-4CD3-8BA7-9930004ABCBD}" v="2" dt="2019-03-09T14:40:10.041"/>
+    <p1510:client id="{88168AFA-D758-4CD3-8BA7-9930004ABCBD}" v="3" dt="2019-03-09T17:01:07.489"/>
   </p1510:revLst>
 </p1510:revInfo>
 </file>
@@ -145,7 +145,7 @@
   <pc:docChgLst>
     <pc:chgData name="Elizabeth Jaye" userId="de304061a751da9d" providerId="LiveId" clId="{88168AFA-D758-4CD3-8BA7-9930004ABCBD}"/>
     <pc:docChg chg="custSel modSld">
-      <pc:chgData name="Elizabeth Jaye" userId="de304061a751da9d" providerId="LiveId" clId="{88168AFA-D758-4CD3-8BA7-9930004ABCBD}" dt="2019-03-09T14:40:10.041" v="786"/>
+      <pc:chgData name="Elizabeth Jaye" userId="de304061a751da9d" providerId="LiveId" clId="{88168AFA-D758-4CD3-8BA7-9930004ABCBD}" dt="2019-03-09T17:01:07.488" v="788"/>
       <pc:docMkLst>
         <pc:docMk/>
       </pc:docMkLst>
@@ -163,6 +163,37 @@
             <ac:spMk id="6" creationId="{AEAF33BA-40C5-4D07-85EA-272E84F4C590}"/>
           </ac:spMkLst>
         </pc:spChg>
+      </pc:sldChg>
+      <pc:sldChg chg="addSp delSp modSp">
+        <pc:chgData name="Elizabeth Jaye" userId="de304061a751da9d" providerId="LiveId" clId="{88168AFA-D758-4CD3-8BA7-9930004ABCBD}" dt="2019-03-09T17:01:07.488" v="788"/>
+        <pc:sldMkLst>
+          <pc:docMk/>
+          <pc:sldMk cId="1181949973" sldId="266"/>
+        </pc:sldMkLst>
+        <pc:spChg chg="add del mod">
+          <ac:chgData name="Elizabeth Jaye" userId="de304061a751da9d" providerId="LiveId" clId="{88168AFA-D758-4CD3-8BA7-9930004ABCBD}" dt="2019-03-09T17:01:07.488" v="788"/>
+          <ac:spMkLst>
+            <pc:docMk/>
+            <pc:sldMk cId="1181949973" sldId="266"/>
+            <ac:spMk id="5" creationId="{BBB7CEA6-FDB8-4E02-B958-4AD806A59A21}"/>
+          </ac:spMkLst>
+        </pc:spChg>
+        <pc:picChg chg="del">
+          <ac:chgData name="Elizabeth Jaye" userId="de304061a751da9d" providerId="LiveId" clId="{88168AFA-D758-4CD3-8BA7-9930004ABCBD}" dt="2019-03-09T17:01:06.531" v="787" actId="478"/>
+          <ac:picMkLst>
+            <pc:docMk/>
+            <pc:sldMk cId="1181949973" sldId="266"/>
+            <ac:picMk id="6" creationId="{E20BB6C7-54AE-4F0B-B0DD-9BB776946DBF}"/>
+          </ac:picMkLst>
+        </pc:picChg>
+        <pc:picChg chg="add mod">
+          <ac:chgData name="Elizabeth Jaye" userId="de304061a751da9d" providerId="LiveId" clId="{88168AFA-D758-4CD3-8BA7-9930004ABCBD}" dt="2019-03-09T17:01:07.488" v="788"/>
+          <ac:picMkLst>
+            <pc:docMk/>
+            <pc:sldMk cId="1181949973" sldId="266"/>
+            <ac:picMk id="8" creationId="{45E50EAF-E6DB-4218-B34A-4360B05FDE6E}"/>
+          </ac:picMkLst>
+        </pc:picChg>
       </pc:sldChg>
       <pc:sldChg chg="addSp modSp modAnim">
         <pc:chgData name="Elizabeth Jaye" userId="de304061a751da9d" providerId="LiveId" clId="{88168AFA-D758-4CD3-8BA7-9930004ABCBD}" dt="2019-03-09T14:40:10.041" v="786"/>
@@ -6766,12 +6797,40 @@
           </a:p>
         </p:txBody>
       </p:sp>
+      <p:sp>
+        <p:nvSpPr>
+          <p:cNvPr id="4" name="Text Placeholder 3">
+            <a:extLst>
+              <a:ext uri="{FF2B5EF4-FFF2-40B4-BE49-F238E27FC236}">
+                <a16:creationId xmlns:a16="http://schemas.microsoft.com/office/drawing/2014/main" id="{DCC92131-E9C0-4708-9063-2F8C8F124067}"/>
+              </a:ext>
+            </a:extLst>
+          </p:cNvPr>
+          <p:cNvSpPr>
+            <a:spLocks noGrp="1"/>
+          </p:cNvSpPr>
+          <p:nvPr>
+            <p:ph type="body" sz="half" idx="2"/>
+          </p:nvPr>
+        </p:nvSpPr>
+        <p:spPr/>
+        <p:txBody>
+          <a:bodyPr/>
+          <a:lstStyle/>
+          <a:p>
+            <a:r>
+              <a:rPr lang="en-US" dirty="0"/>
+              <a:t>Age Groups</a:t>
+            </a:r>
+          </a:p>
+        </p:txBody>
+      </p:sp>
       <p:pic>
         <p:nvPicPr>
-          <p:cNvPr id="6" name="Content Placeholder 5">
+          <p:cNvPr id="8" name="Content Placeholder 7">
             <a:extLst>
               <a:ext uri="{FF2B5EF4-FFF2-40B4-BE49-F238E27FC236}">
-                <a16:creationId xmlns:a16="http://schemas.microsoft.com/office/drawing/2014/main" id="{E20BB6C7-54AE-4F0B-B0DD-9BB776946DBF}"/>
+                <a16:creationId xmlns:a16="http://schemas.microsoft.com/office/drawing/2014/main" id="{45E50EAF-E6DB-4218-B34A-4360B05FDE6E}"/>
               </a:ext>
             </a:extLst>
           </p:cNvPr>
@@ -6796,39 +6855,11 @@
         </p:blipFill>
         <p:spPr>
           <a:xfrm>
-            <a:off x="304800" y="1219200"/>
-            <a:ext cx="7555892" cy="3635265"/>
+            <a:off x="838200" y="1774934"/>
+            <a:ext cx="6400800" cy="3079531"/>
           </a:xfrm>
         </p:spPr>
       </p:pic>
-      <p:sp>
-        <p:nvSpPr>
-          <p:cNvPr id="4" name="Text Placeholder 3">
-            <a:extLst>
-              <a:ext uri="{FF2B5EF4-FFF2-40B4-BE49-F238E27FC236}">
-                <a16:creationId xmlns:a16="http://schemas.microsoft.com/office/drawing/2014/main" id="{DCC92131-E9C0-4708-9063-2F8C8F124067}"/>
-              </a:ext>
-            </a:extLst>
-          </p:cNvPr>
-          <p:cNvSpPr>
-            <a:spLocks noGrp="1"/>
-          </p:cNvSpPr>
-          <p:nvPr>
-            <p:ph type="body" sz="half" idx="2"/>
-          </p:nvPr>
-        </p:nvSpPr>
-        <p:spPr/>
-        <p:txBody>
-          <a:bodyPr/>
-          <a:lstStyle/>
-          <a:p>
-            <a:r>
-              <a:rPr lang="en-US" dirty="0"/>
-              <a:t>Age Groups</a:t>
-            </a:r>
-          </a:p>
-        </p:txBody>
-      </p:sp>
     </p:spTree>
     <p:extLst>
       <p:ext uri="{BB962C8B-B14F-4D97-AF65-F5344CB8AC3E}">

</xml_diff>